<commit_message>
Add more of the material from the undergrad course
</commit_message>
<xml_diff>
--- a/teaching_with_freebsd.pptx
+++ b/teaching_with_freebsd.pptx
@@ -6,30 +6,37 @@
   </p:sldMasterIdLst>
   <p:sldIdLst>
     <p:sldId id="256" r:id="rId2"/>
-    <p:sldId id="278" r:id="rId3"/>
-    <p:sldId id="257" r:id="rId4"/>
-    <p:sldId id="258" r:id="rId5"/>
+    <p:sldId id="289" r:id="rId3"/>
+    <p:sldId id="278" r:id="rId4"/>
+    <p:sldId id="257" r:id="rId5"/>
     <p:sldId id="259" r:id="rId6"/>
-    <p:sldId id="260" r:id="rId7"/>
-    <p:sldId id="261" r:id="rId8"/>
-    <p:sldId id="262" r:id="rId9"/>
-    <p:sldId id="263" r:id="rId10"/>
-    <p:sldId id="264" r:id="rId11"/>
-    <p:sldId id="265" r:id="rId12"/>
-    <p:sldId id="266" r:id="rId13"/>
-    <p:sldId id="267" r:id="rId14"/>
-    <p:sldId id="268" r:id="rId15"/>
-    <p:sldId id="269" r:id="rId16"/>
-    <p:sldId id="270" r:id="rId17"/>
-    <p:sldId id="271" r:id="rId18"/>
-    <p:sldId id="272" r:id="rId19"/>
-    <p:sldId id="273" r:id="rId20"/>
-    <p:sldId id="279" r:id="rId21"/>
-    <p:sldId id="282" r:id="rId22"/>
-    <p:sldId id="281" r:id="rId23"/>
-    <p:sldId id="274" r:id="rId24"/>
-    <p:sldId id="275" r:id="rId25"/>
-    <p:sldId id="276" r:id="rId26"/>
+    <p:sldId id="261" r:id="rId7"/>
+    <p:sldId id="258" r:id="rId8"/>
+    <p:sldId id="260" r:id="rId9"/>
+    <p:sldId id="262" r:id="rId10"/>
+    <p:sldId id="263" r:id="rId11"/>
+    <p:sldId id="264" r:id="rId12"/>
+    <p:sldId id="265" r:id="rId13"/>
+    <p:sldId id="266" r:id="rId14"/>
+    <p:sldId id="267" r:id="rId15"/>
+    <p:sldId id="268" r:id="rId16"/>
+    <p:sldId id="269" r:id="rId17"/>
+    <p:sldId id="270" r:id="rId18"/>
+    <p:sldId id="271" r:id="rId19"/>
+    <p:sldId id="272" r:id="rId20"/>
+    <p:sldId id="273" r:id="rId21"/>
+    <p:sldId id="279" r:id="rId22"/>
+    <p:sldId id="282" r:id="rId23"/>
+    <p:sldId id="284" r:id="rId24"/>
+    <p:sldId id="285" r:id="rId25"/>
+    <p:sldId id="286" r:id="rId26"/>
+    <p:sldId id="287" r:id="rId27"/>
+    <p:sldId id="288" r:id="rId28"/>
+    <p:sldId id="283" r:id="rId29"/>
+    <p:sldId id="281" r:id="rId30"/>
+    <p:sldId id="274" r:id="rId31"/>
+    <p:sldId id="275" r:id="rId32"/>
+    <p:sldId id="276" r:id="rId33"/>
   </p:sldIdLst>
   <p:sldSz cx="12192000" cy="6858000"/>
   <p:notesSz cx="6858000" cy="9144000"/>
@@ -3513,10 +3520,149 @@
   <p:clrMapOvr>
     <a:masterClrMapping/>
   </p:clrMapOvr>
+  <p:timing>
+    <p:tnLst>
+      <p:par>
+        <p:cTn id="1" dur="indefinite" restart="never" nodeType="tmRoot"/>
+      </p:par>
+    </p:tnLst>
+  </p:timing>
 </p:sld>
 </file>
 
 <file path=ppt/slides/slide10.xml><?xml version="1.0" encoding="utf-8"?>
+<p:sld xmlns:a="http://schemas.openxmlformats.org/drawingml/2006/main" xmlns:r="http://schemas.openxmlformats.org/officeDocument/2006/relationships" xmlns:p="http://schemas.openxmlformats.org/presentationml/2006/main">
+  <p:cSld>
+    <p:spTree>
+      <p:nvGrpSpPr>
+        <p:cNvPr id="1" name=""/>
+        <p:cNvGrpSpPr/>
+        <p:nvPr/>
+      </p:nvGrpSpPr>
+      <p:grpSpPr>
+        <a:xfrm>
+          <a:off x="0" y="0"/>
+          <a:ext cx="0" cy="0"/>
+          <a:chOff x="0" y="0"/>
+          <a:chExt cx="0" cy="0"/>
+        </a:xfrm>
+      </p:grpSpPr>
+      <p:sp>
+        <p:nvSpPr>
+          <p:cNvPr id="2" name="Title 1"/>
+          <p:cNvSpPr>
+            <a:spLocks noGrp="1"/>
+          </p:cNvSpPr>
+          <p:nvPr>
+            <p:ph type="title"/>
+          </p:nvPr>
+        </p:nvSpPr>
+        <p:spPr/>
+        <p:txBody>
+          <a:bodyPr/>
+          <a:lstStyle/>
+          <a:p>
+            <a:r>
+              <a:rPr lang="en-US" smtClean="0"/>
+              <a:t>Weeks 1–2: Introduction to kernels and tracing</a:t>
+            </a:r>
+            <a:endParaRPr lang="en-US" dirty="0"/>
+          </a:p>
+        </p:txBody>
+      </p:sp>
+      <p:pic>
+        <p:nvPicPr>
+          <p:cNvPr id="9" name="Content Placeholder 8"/>
+          <p:cNvPicPr>
+            <a:picLocks noGrp="1" noChangeAspect="1"/>
+          </p:cNvPicPr>
+          <p:nvPr>
+            <p:ph idx="1"/>
+          </p:nvPr>
+        </p:nvPicPr>
+        <p:blipFill>
+          <a:blip r:embed="rId2">
+            <a:extLst>
+              <a:ext uri="{28A0092B-C50C-407E-A947-70E740481C1C}">
+                <a14:useLocalDpi xmlns:a14="http://schemas.microsoft.com/office/drawing/2010/main"/>
+              </a:ext>
+            </a:extLst>
+          </a:blip>
+          <a:stretch>
+            <a:fillRect/>
+          </a:stretch>
+        </p:blipFill>
+        <p:spPr>
+          <a:xfrm>
+            <a:off x="3658842" y="1825625"/>
+            <a:ext cx="4874316" cy="2746375"/>
+          </a:xfrm>
+        </p:spPr>
+      </p:pic>
+      <p:sp>
+        <p:nvSpPr>
+          <p:cNvPr id="5" name="Content Placeholder 4"/>
+          <p:cNvSpPr>
+            <a:spLocks noGrp="1"/>
+          </p:cNvSpPr>
+          <p:nvPr>
+            <p:ph idx="13"/>
+          </p:nvPr>
+        </p:nvSpPr>
+        <p:spPr/>
+        <p:txBody>
+          <a:bodyPr>
+            <a:normAutofit fontScale="85000" lnSpcReduction="20000"/>
+          </a:bodyPr>
+          <a:lstStyle/>
+          <a:p>
+            <a:r>
+              <a:rPr lang="en-US" smtClean="0"/>
+              <a:t>Lecture1: Introduction: OSes ,Systems Research ,andL41   </a:t>
+            </a:r>
+          </a:p>
+          <a:p>
+            <a:r>
+              <a:rPr lang="en-US" smtClean="0"/>
+              <a:t>Lecture2: Kernels and Tracing</a:t>
+            </a:r>
+          </a:p>
+          <a:p>
+            <a:r>
+              <a:rPr lang="en-US" smtClean="0"/>
+              <a:t>Lab1:Getting started with kernel tracing / POSIX I/O</a:t>
+            </a:r>
+          </a:p>
+          <a:p>
+            <a:r>
+              <a:rPr lang="en-US" smtClean="0"/>
+              <a:t>LabReport1: I/O Performance(practice)</a:t>
+            </a:r>
+            <a:endParaRPr lang="en-US" dirty="0"/>
+          </a:p>
+        </p:txBody>
+      </p:sp>
+    </p:spTree>
+    <p:extLst>
+      <p:ext uri="{BB962C8B-B14F-4D97-AF65-F5344CB8AC3E}">
+        <p14:creationId xmlns:p14="http://schemas.microsoft.com/office/powerpoint/2010/main" val="1711959560"/>
+      </p:ext>
+    </p:extLst>
+  </p:cSld>
+  <p:clrMapOvr>
+    <a:masterClrMapping/>
+  </p:clrMapOvr>
+  <p:timing>
+    <p:tnLst>
+      <p:par>
+        <p:cTn id="1" dur="indefinite" restart="never" nodeType="tmRoot"/>
+      </p:par>
+    </p:tnLst>
+  </p:timing>
+</p:sld>
+</file>
+
+<file path=ppt/slides/slide11.xml><?xml version="1.0" encoding="utf-8"?>
 <p:sld xmlns:a="http://schemas.openxmlformats.org/drawingml/2006/main" xmlns:r="http://schemas.openxmlformats.org/officeDocument/2006/relationships" xmlns:p="http://schemas.openxmlformats.org/presentationml/2006/main">
   <p:cSld>
     <p:spTree>
@@ -3651,7 +3797,7 @@
 </p:sld>
 </file>
 
-<file path=ppt/slides/slide11.xml><?xml version="1.0" encoding="utf-8"?>
+<file path=ppt/slides/slide12.xml><?xml version="1.0" encoding="utf-8"?>
 <p:sld xmlns:a="http://schemas.openxmlformats.org/drawingml/2006/main" xmlns:r="http://schemas.openxmlformats.org/officeDocument/2006/relationships" xmlns:p="http://schemas.openxmlformats.org/presentationml/2006/main">
   <p:cSld>
     <p:spTree>
@@ -3783,7 +3929,7 @@
 </p:sld>
 </file>
 
-<file path=ppt/slides/slide12.xml><?xml version="1.0" encoding="utf-8"?>
+<file path=ppt/slides/slide13.xml><?xml version="1.0" encoding="utf-8"?>
 <p:sld xmlns:a="http://schemas.openxmlformats.org/drawingml/2006/main" xmlns:r="http://schemas.openxmlformats.org/officeDocument/2006/relationships" xmlns:p="http://schemas.openxmlformats.org/presentationml/2006/main">
   <p:cSld>
     <p:spTree>
@@ -3867,136 +4013,6 @@
 </p:sld>
 </file>
 
-<file path=ppt/slides/slide13.xml><?xml version="1.0" encoding="utf-8"?>
-<p:sld xmlns:a="http://schemas.openxmlformats.org/drawingml/2006/main" xmlns:r="http://schemas.openxmlformats.org/officeDocument/2006/relationships" xmlns:p="http://schemas.openxmlformats.org/presentationml/2006/main">
-  <p:cSld>
-    <p:spTree>
-      <p:nvGrpSpPr>
-        <p:cNvPr id="1" name=""/>
-        <p:cNvGrpSpPr/>
-        <p:nvPr/>
-      </p:nvGrpSpPr>
-      <p:grpSpPr>
-        <a:xfrm>
-          <a:off x="0" y="0"/>
-          <a:ext cx="0" cy="0"/>
-          <a:chOff x="0" y="0"/>
-          <a:chExt cx="0" cy="0"/>
-        </a:xfrm>
-      </p:grpSpPr>
-      <p:sp>
-        <p:nvSpPr>
-          <p:cNvPr id="2" name="Title 1"/>
-          <p:cNvSpPr>
-            <a:spLocks noGrp="1"/>
-          </p:cNvSpPr>
-          <p:nvPr>
-            <p:ph type="title"/>
-          </p:nvPr>
-        </p:nvSpPr>
-        <p:spPr/>
-        <p:txBody>
-          <a:bodyPr/>
-          <a:lstStyle/>
-          <a:p>
-            <a:r>
-              <a:rPr lang="en-US" smtClean="0"/>
-              <a:t>What worked?</a:t>
-            </a:r>
-            <a:endParaRPr lang="en-US" dirty="0"/>
-          </a:p>
-        </p:txBody>
-      </p:sp>
-      <p:sp>
-        <p:nvSpPr>
-          <p:cNvPr id="5" name="Content Placeholder 4"/>
-          <p:cNvSpPr>
-            <a:spLocks noGrp="1"/>
-          </p:cNvSpPr>
-          <p:nvPr>
-            <p:ph idx="1"/>
-          </p:nvPr>
-        </p:nvSpPr>
-        <p:spPr/>
-        <p:txBody>
-          <a:bodyPr>
-            <a:normAutofit/>
-          </a:bodyPr>
-          <a:lstStyle/>
-          <a:p>
-            <a:r>
-              <a:rPr lang="en-US" smtClean="0"/>
-              <a:t>Tracing is a great way to teach about complex systems!</a:t>
-            </a:r>
-          </a:p>
-          <a:p>
-            <a:r>
-              <a:rPr lang="en-US" smtClean="0"/>
-              <a:t>Surprisingly comprehensive and good lab reports/analysis</a:t>
-            </a:r>
-          </a:p>
-          <a:p>
-            <a:pPr lvl="1"/>
-            <a:r>
-              <a:rPr lang="en-US" smtClean="0"/>
-              <a:t>E.g., cache hit vs. system-call rates to explain IPC performance</a:t>
-            </a:r>
-          </a:p>
-          <a:p>
-            <a:r>
-              <a:rPr lang="en-US" smtClean="0"/>
-              <a:t>TCP time-sequence plots! TCP state machines!</a:t>
-            </a:r>
-          </a:p>
-          <a:p>
-            <a:r>
-              <a:rPr lang="en-US" smtClean="0"/>
-              <a:t>Real explanations of interesting artefacts</a:t>
-            </a:r>
-          </a:p>
-          <a:p>
-            <a:pPr lvl="1"/>
-            <a:r>
-              <a:rPr lang="en-US" smtClean="0"/>
-              <a:t>E.g., probe effects, superpages, DUMMYNET timer effects, etc.</a:t>
-            </a:r>
-          </a:p>
-          <a:p>
-            <a:r>
-              <a:rPr lang="en-US" smtClean="0"/>
-              <a:t>Embedded board platform(generally) worked really well</a:t>
-            </a:r>
-          </a:p>
-          <a:p>
-            <a:pPr lvl="1"/>
-            <a:r>
-              <a:rPr lang="en-US" smtClean="0"/>
-              <a:t>Could not have done these experiments on VMs</a:t>
-            </a:r>
-            <a:endParaRPr lang="en-US" dirty="0"/>
-          </a:p>
-        </p:txBody>
-      </p:sp>
-    </p:spTree>
-    <p:extLst>
-      <p:ext uri="{BB962C8B-B14F-4D97-AF65-F5344CB8AC3E}">
-        <p14:creationId xmlns:p14="http://schemas.microsoft.com/office/powerpoint/2010/main" val="89357214"/>
-      </p:ext>
-    </p:extLst>
-  </p:cSld>
-  <p:clrMapOvr>
-    <a:masterClrMapping/>
-  </p:clrMapOvr>
-  <p:timing>
-    <p:tnLst>
-      <p:par>
-        <p:cTn id="1" dur="indefinite" restart="never" nodeType="tmRoot"/>
-      </p:par>
-    </p:tnLst>
-  </p:timing>
-</p:sld>
-</file>
-
 <file path=ppt/slides/slide14.xml><?xml version="1.0" encoding="utf-8"?>
 <p:sld xmlns:a="http://schemas.openxmlformats.org/drawingml/2006/main" xmlns:r="http://schemas.openxmlformats.org/officeDocument/2006/relationships" xmlns:p="http://schemas.openxmlformats.org/presentationml/2006/main">
   <p:cSld>
@@ -4031,7 +4047,7 @@
           <a:p>
             <a:r>
               <a:rPr lang="en-US" smtClean="0"/>
-              <a:t>Teaching Practitioners</a:t>
+              <a:t>What worked?</a:t>
             </a:r>
             <a:endParaRPr lang="en-US" dirty="0"/>
           </a:p>
@@ -4049,53 +4065,59 @@
         </p:nvSpPr>
         <p:spPr/>
         <p:txBody>
-          <a:bodyPr/>
-          <a:lstStyle/>
-          <a:p>
-            <a:r>
-              <a:rPr lang="en-US" smtClean="0"/>
-              <a:t>We can assume more background:</a:t>
+          <a:bodyPr>
+            <a:normAutofit/>
+          </a:bodyPr>
+          <a:lstStyle/>
+          <a:p>
+            <a:r>
+              <a:rPr lang="en-US" smtClean="0"/>
+              <a:t>Tracing is a great way to teach about complex systems!</a:t>
+            </a:r>
+          </a:p>
+          <a:p>
+            <a:r>
+              <a:rPr lang="en-US" smtClean="0"/>
+              <a:t>Surprisingly comprehensive and good lab reports/analysis</a:t>
             </a:r>
           </a:p>
           <a:p>
             <a:pPr lvl="1"/>
             <a:r>
               <a:rPr lang="en-US" smtClean="0"/>
-              <a:t>Some knowledge of programming</a:t>
+              <a:t>E.g., cache hit vs. system-call rates to explain IPC performance</a:t>
+            </a:r>
+          </a:p>
+          <a:p>
+            <a:r>
+              <a:rPr lang="en-US" smtClean="0"/>
+              <a:t>TCP time-sequence plots! TCP state machines!</a:t>
+            </a:r>
+          </a:p>
+          <a:p>
+            <a:r>
+              <a:rPr lang="en-US" smtClean="0"/>
+              <a:t>Real explanations of interesting artefacts</a:t>
             </a:r>
           </a:p>
           <a:p>
             <a:pPr lvl="1"/>
             <a:r>
               <a:rPr lang="en-US" smtClean="0"/>
-              <a:t>Experience with Unix</a:t>
+              <a:t>E.g., probe effects, superpages, DUMMYNET timer effects, etc.</a:t>
+            </a:r>
+          </a:p>
+          <a:p>
+            <a:r>
+              <a:rPr lang="en-US" smtClean="0"/>
+              <a:t>Embedded board platform(generally) worked really well</a:t>
             </a:r>
           </a:p>
           <a:p>
             <a:pPr lvl="1"/>
             <a:r>
               <a:rPr lang="en-US" smtClean="0"/>
-              <a:t>Have real problems to solve</a:t>
-            </a:r>
-          </a:p>
-          <a:p>
-            <a:r>
-              <a:rPr lang="en-US" smtClean="0"/>
-              <a:t>But not assume everything:</a:t>
-            </a:r>
-          </a:p>
-          <a:p>
-            <a:pPr lvl="1"/>
-            <a:r>
-              <a:rPr lang="en-US" smtClean="0"/>
-              <a:t>Kernel Internals</a:t>
-            </a:r>
-          </a:p>
-          <a:p>
-            <a:pPr lvl="1"/>
-            <a:r>
-              <a:rPr lang="en-US" smtClean="0"/>
-              <a:t>Deep understanding of corner cases</a:t>
+              <a:t>Could not have done these experiments on VMs</a:t>
             </a:r>
             <a:endParaRPr lang="en-US" dirty="0"/>
           </a:p>
@@ -4104,7 +4126,7 @@
     </p:spTree>
     <p:extLst>
       <p:ext uri="{BB962C8B-B14F-4D97-AF65-F5344CB8AC3E}">
-        <p14:creationId xmlns:p14="http://schemas.microsoft.com/office/powerpoint/2010/main" val="735626445"/>
+        <p14:creationId xmlns:p14="http://schemas.microsoft.com/office/powerpoint/2010/main" val="89357214"/>
       </p:ext>
     </p:extLst>
   </p:cSld>
@@ -4155,7 +4177,7 @@
           <a:p>
             <a:r>
               <a:rPr lang="en-US" smtClean="0"/>
-              <a:t>Goals of the Practitioner Course</a:t>
+              <a:t>Teaching Practitioners</a:t>
             </a:r>
             <a:endParaRPr lang="en-US" dirty="0"/>
           </a:p>
@@ -4177,35 +4199,49 @@
           <a:lstStyle/>
           <a:p>
             <a:r>
-              <a:rPr lang="en-US" dirty="0" smtClean="0"/>
-              <a:t>Familiarize </a:t>
-            </a:r>
-            <a:r>
-              <a:rPr lang="en-US" dirty="0" smtClean="0"/>
-              <a:t>people </a:t>
-            </a:r>
-            <a:r>
-              <a:rPr lang="en-US" dirty="0" err="1" smtClean="0"/>
-              <a:t>withDTrace</a:t>
-            </a:r>
-            <a:endParaRPr lang="en-US" dirty="0" smtClean="0"/>
-          </a:p>
-          <a:p>
-            <a:r>
-              <a:rPr lang="en-US" dirty="0" smtClean="0"/>
-              <a:t>Give them practical tools for their problems </a:t>
-            </a:r>
-          </a:p>
-          <a:p>
-            <a:r>
-              <a:rPr lang="en-US" dirty="0" smtClean="0"/>
-              <a:t>Educate them about how the OS works</a:t>
-            </a:r>
-          </a:p>
-          <a:p>
-            <a:r>
-              <a:rPr lang="en-US" dirty="0" smtClean="0"/>
-              <a:t>Dispel fear</a:t>
+              <a:rPr lang="en-US" smtClean="0"/>
+              <a:t>We can assume more background:</a:t>
+            </a:r>
+          </a:p>
+          <a:p>
+            <a:pPr lvl="1"/>
+            <a:r>
+              <a:rPr lang="en-US" smtClean="0"/>
+              <a:t>Some knowledge of programming</a:t>
+            </a:r>
+          </a:p>
+          <a:p>
+            <a:pPr lvl="1"/>
+            <a:r>
+              <a:rPr lang="en-US" smtClean="0"/>
+              <a:t>Experience with Unix</a:t>
+            </a:r>
+          </a:p>
+          <a:p>
+            <a:pPr lvl="1"/>
+            <a:r>
+              <a:rPr lang="en-US" smtClean="0"/>
+              <a:t>Have real problems to solve</a:t>
+            </a:r>
+          </a:p>
+          <a:p>
+            <a:r>
+              <a:rPr lang="en-US" smtClean="0"/>
+              <a:t>But not assume everything:</a:t>
+            </a:r>
+          </a:p>
+          <a:p>
+            <a:pPr lvl="1"/>
+            <a:r>
+              <a:rPr lang="en-US" smtClean="0"/>
+              <a:t>Kernel Internals</a:t>
+            </a:r>
+          </a:p>
+          <a:p>
+            <a:pPr lvl="1"/>
+            <a:r>
+              <a:rPr lang="en-US" smtClean="0"/>
+              <a:t>Deep understanding of corner cases</a:t>
             </a:r>
             <a:endParaRPr lang="en-US" dirty="0"/>
           </a:p>
@@ -4214,7 +4250,7 @@
     </p:spTree>
     <p:extLst>
       <p:ext uri="{BB962C8B-B14F-4D97-AF65-F5344CB8AC3E}">
-        <p14:creationId xmlns:p14="http://schemas.microsoft.com/office/powerpoint/2010/main" val="610305336"/>
+        <p14:creationId xmlns:p14="http://schemas.microsoft.com/office/powerpoint/2010/main" val="735626445"/>
       </p:ext>
     </p:extLst>
   </p:cSld>
@@ -4265,7 +4301,7 @@
           <a:p>
             <a:r>
               <a:rPr lang="en-US" smtClean="0"/>
-              <a:t>The Practitioner’s Course</a:t>
+              <a:t>Goals of the Practitioner Course</a:t>
             </a:r>
             <a:endParaRPr lang="en-US" dirty="0"/>
           </a:p>
@@ -4283,74 +4319,48 @@
         </p:nvSpPr>
         <p:spPr/>
         <p:txBody>
-          <a:bodyPr>
-            <a:normAutofit/>
-          </a:bodyPr>
-          <a:lstStyle/>
-          <a:p>
-            <a:r>
-              <a:rPr lang="en-US" dirty="0" smtClean="0"/>
-              <a:t>Two</a:t>
-            </a:r>
-            <a:r>
-              <a:rPr lang="en-US" dirty="0" smtClean="0"/>
-              <a:t>, 8 hour days</a:t>
-            </a:r>
-          </a:p>
-          <a:p>
-            <a:r>
-              <a:rPr lang="en-US" dirty="0" smtClean="0"/>
-              <a:t>Platform Is student’s laptop or virtual machine   </a:t>
-            </a:r>
-          </a:p>
-          <a:p>
-            <a:r>
-              <a:rPr lang="en-US" dirty="0" smtClean="0"/>
-              <a:t>Taught at </a:t>
+          <a:bodyPr/>
+          <a:lstStyle/>
+          <a:p>
+            <a:r>
+              <a:rPr lang="en-US" dirty="0" smtClean="0"/>
+              <a:t>Familiarize </a:t>
+            </a:r>
+            <a:r>
+              <a:rPr lang="en-US" dirty="0" smtClean="0"/>
+              <a:t>people </a:t>
             </a:r>
             <a:r>
               <a:rPr lang="en-US" dirty="0" err="1" smtClean="0"/>
-              <a:t>AsiaBSDCon</a:t>
-            </a:r>
-            <a:r>
-              <a:rPr lang="en-US" dirty="0" smtClean="0"/>
-              <a:t> 2016, </a:t>
-            </a:r>
-            <a:r>
-              <a:rPr lang="en-US" dirty="0" err="1" smtClean="0"/>
-              <a:t>BSDCan</a:t>
-            </a:r>
-            <a:r>
-              <a:rPr lang="en-US" dirty="0" smtClean="0"/>
-              <a:t> 2015, 2016, </a:t>
+              <a:t>withDTrace</a:t>
             </a:r>
             <a:endParaRPr lang="en-US" dirty="0" smtClean="0"/>
           </a:p>
           <a:p>
             <a:r>
               <a:rPr lang="en-US" dirty="0" smtClean="0"/>
-              <a:t>Next </a:t>
-            </a:r>
-            <a:r>
-              <a:rPr lang="en-US" dirty="0" smtClean="0"/>
-              <a:t>course: </a:t>
-            </a:r>
-            <a:r>
-              <a:rPr lang="en-US" dirty="0" err="1" smtClean="0"/>
-              <a:t>EuroBSD</a:t>
-            </a:r>
-            <a:r>
-              <a:rPr lang="en-US" dirty="0" smtClean="0"/>
-              <a:t> 2016 in Belgrade</a:t>
-            </a:r>
-            <a:endParaRPr lang="en-US" dirty="0" smtClean="0"/>
+              <a:t>Give them practical tools for their problems </a:t>
+            </a:r>
+          </a:p>
+          <a:p>
+            <a:r>
+              <a:rPr lang="en-US" dirty="0" smtClean="0"/>
+              <a:t>Educate them about how the OS works</a:t>
+            </a:r>
+          </a:p>
+          <a:p>
+            <a:r>
+              <a:rPr lang="en-US" dirty="0" smtClean="0"/>
+              <a:t>Dispel fear</a:t>
+            </a:r>
+            <a:endParaRPr lang="en-US" dirty="0"/>
           </a:p>
         </p:txBody>
       </p:sp>
     </p:spTree>
     <p:extLst>
       <p:ext uri="{BB962C8B-B14F-4D97-AF65-F5344CB8AC3E}">
-        <p14:creationId xmlns:p14="http://schemas.microsoft.com/office/powerpoint/2010/main" val="1019884080"/>
+        <p14:creationId xmlns:p14="http://schemas.microsoft.com/office/powerpoint/2010/main" val="610305336"/>
       </p:ext>
     </p:extLst>
   </p:cSld>
@@ -4401,7 +4411,7 @@
           <a:p>
             <a:r>
               <a:rPr lang="en-US" smtClean="0"/>
-              <a:t>What we teach</a:t>
+              <a:t>The Practitioner’s Course</a:t>
             </a:r>
             <a:endParaRPr lang="en-US" dirty="0"/>
           </a:p>
@@ -4409,7 +4419,7 @@
       </p:sp>
       <p:sp>
         <p:nvSpPr>
-          <p:cNvPr id="3" name="Content Placeholder 2"/>
+          <p:cNvPr id="5" name="Content Placeholder 4"/>
           <p:cNvSpPr>
             <a:spLocks noGrp="1"/>
           </p:cNvSpPr>
@@ -4419,45 +4429,74 @@
         </p:nvSpPr>
         <p:spPr/>
         <p:txBody>
-          <a:bodyPr/>
-          <a:lstStyle/>
-          <a:p>
-            <a:r>
-              <a:rPr lang="en-US" smtClean="0"/>
-              <a:t>Intro to DTrace</a:t>
-            </a:r>
-          </a:p>
-          <a:p>
-            <a:r>
-              <a:rPr lang="en-US" smtClean="0"/>
-              <a:t>Locking</a:t>
-            </a:r>
-          </a:p>
-          <a:p>
-            <a:r>
-              <a:rPr lang="en-US" smtClean="0"/>
-              <a:t>Scheduler</a:t>
-            </a:r>
-          </a:p>
-          <a:p>
-            <a:r>
-              <a:rPr lang="en-US" smtClean="0"/>
-              <a:t>Files and the Filesystem </a:t>
-            </a:r>
-          </a:p>
-          <a:p>
-            <a:r>
-              <a:rPr lang="en-US" smtClean="0"/>
-              <a:t>Networking</a:t>
-            </a:r>
-            <a:endParaRPr lang="en-US" dirty="0"/>
+          <a:bodyPr>
+            <a:normAutofit/>
+          </a:bodyPr>
+          <a:lstStyle/>
+          <a:p>
+            <a:r>
+              <a:rPr lang="en-US" dirty="0" smtClean="0"/>
+              <a:t>Two</a:t>
+            </a:r>
+            <a:r>
+              <a:rPr lang="en-US" dirty="0" smtClean="0"/>
+              <a:t>, 8 hour days</a:t>
+            </a:r>
+          </a:p>
+          <a:p>
+            <a:r>
+              <a:rPr lang="en-US" dirty="0" smtClean="0"/>
+              <a:t>Platform Is student’s laptop or virtual machine   </a:t>
+            </a:r>
+          </a:p>
+          <a:p>
+            <a:r>
+              <a:rPr lang="en-US" dirty="0" smtClean="0"/>
+              <a:t>Taught at </a:t>
+            </a:r>
+            <a:r>
+              <a:rPr lang="en-US" dirty="0" err="1" smtClean="0"/>
+              <a:t>AsiaBSDCon</a:t>
+            </a:r>
+            <a:r>
+              <a:rPr lang="en-US" dirty="0" smtClean="0"/>
+              <a:t> 2016, </a:t>
+            </a:r>
+            <a:r>
+              <a:rPr lang="en-US" dirty="0" err="1" smtClean="0"/>
+              <a:t>BSDCan</a:t>
+            </a:r>
+            <a:r>
+              <a:rPr lang="en-US" dirty="0" smtClean="0"/>
+              <a:t> 2015, 2016, </a:t>
+            </a:r>
+            <a:endParaRPr lang="en-US" dirty="0" smtClean="0"/>
+          </a:p>
+          <a:p>
+            <a:r>
+              <a:rPr lang="en-US" dirty="0" smtClean="0"/>
+              <a:t>Next </a:t>
+            </a:r>
+            <a:r>
+              <a:rPr lang="en-US" dirty="0" smtClean="0"/>
+              <a:t>course: </a:t>
+            </a:r>
+            <a:r>
+              <a:rPr lang="en-US" dirty="0" err="1" smtClean="0"/>
+              <a:t>EuroBSD</a:t>
+            </a:r>
+            <a:r>
+              <a:rPr lang="en-US" dirty="0" smtClean="0"/>
+              <a:t> 2016 in Belgrade</a:t>
+            </a:r>
+            <a:endParaRPr lang="en-US" dirty="0" smtClean="0"/>
           </a:p>
         </p:txBody>
       </p:sp>
     </p:spTree>
     <p:extLst>
       <p:ext uri="{BB962C8B-B14F-4D97-AF65-F5344CB8AC3E}">
-        <p14:creationId xmlns:p14="http://schemas.microsoft.com/office/powerpoint/2010/main" val="2124745853"/>
+        <p14:creationId xmlns:p14="http://schemas.microsoft.com/office/powerpoint/2010/main" val="1019884080"/>
       </p:ext>
     </p:extLst>
   </p:cSld>
@@ -4508,7 +4547,7 @@
           <a:p>
             <a:r>
               <a:rPr lang="en-US" smtClean="0"/>
-              <a:t>Course Example</a:t>
+              <a:t>What we teach</a:t>
             </a:r>
             <a:endParaRPr lang="en-US" dirty="0"/>
           </a:p>
@@ -4526,74 +4565,45 @@
         </p:nvSpPr>
         <p:spPr/>
         <p:txBody>
-          <a:bodyPr>
-            <a:normAutofit fontScale="92500" lnSpcReduction="20000"/>
-          </a:bodyPr>
-          <a:lstStyle/>
-          <a:p>
-            <a:r>
-              <a:rPr lang="en-US" smtClean="0"/>
-              <a:t>What names are being looked up?</a:t>
-            </a:r>
-          </a:p>
-          <a:p>
-            <a:endParaRPr lang="en-US" smtClean="0"/>
-          </a:p>
-          <a:p>
-            <a:r>
-              <a:rPr lang="en-US" smtClean="0"/>
-              <a:t>dtrace -n ’vfs:namei:lookup:entry \</a:t>
-            </a:r>
-          </a:p>
-          <a:p>
-            <a:r>
-              <a:rPr lang="de-DE" smtClean="0"/>
-              <a:t>        { printf("%s", stringof(arg1));}’</a:t>
-            </a:r>
-          </a:p>
-          <a:p>
-            <a:r>
-              <a:rPr lang="de-DE" smtClean="0"/>
-              <a:t>CPU     ID FUNCTION:NAME</a:t>
-            </a:r>
-          </a:p>
-          <a:p>
-            <a:r>
-              <a:rPr lang="de-DE" smtClean="0"/>
-              <a:t>  2  27847 lookup:entry /bin/ls</a:t>
-            </a:r>
-          </a:p>
-          <a:p>
-            <a:r>
-              <a:rPr lang="de-DE" smtClean="0"/>
-              <a:t>  2  27847 lookup:entry /libexec/ld-elf.so.1</a:t>
-            </a:r>
-          </a:p>
-          <a:p>
-            <a:r>
-              <a:rPr lang="de-DE" smtClean="0"/>
-              <a:t>  2  27847 lookup:entry /etc</a:t>
-            </a:r>
-          </a:p>
-          <a:p>
-            <a:r>
-              <a:rPr lang="de-DE" smtClean="0"/>
-              <a:t>  2  27847 lookup:entry /etc/libmap.conf</a:t>
-            </a:r>
-          </a:p>
-          <a:p>
-            <a:r>
-              <a:rPr lang="de-DE" smtClean="0"/>
-              <a:t>  2  27847 lookup:entry /etc/libmap.conf</a:t>
-            </a:r>
-            <a:endParaRPr lang="de-DE" dirty="0" smtClean="0"/>
+          <a:bodyPr/>
+          <a:lstStyle/>
+          <a:p>
+            <a:r>
+              <a:rPr lang="en-US" smtClean="0"/>
+              <a:t>Intro to DTrace</a:t>
+            </a:r>
+          </a:p>
+          <a:p>
+            <a:r>
+              <a:rPr lang="en-US" smtClean="0"/>
+              <a:t>Locking</a:t>
+            </a:r>
+          </a:p>
+          <a:p>
+            <a:r>
+              <a:rPr lang="en-US" smtClean="0"/>
+              <a:t>Scheduler</a:t>
+            </a:r>
+          </a:p>
+          <a:p>
+            <a:r>
+              <a:rPr lang="en-US" smtClean="0"/>
+              <a:t>Files and the Filesystem </a:t>
+            </a:r>
+          </a:p>
+          <a:p>
+            <a:r>
+              <a:rPr lang="en-US" smtClean="0"/>
+              <a:t>Networking</a:t>
+            </a:r>
+            <a:endParaRPr lang="en-US" dirty="0"/>
           </a:p>
         </p:txBody>
       </p:sp>
     </p:spTree>
     <p:extLst>
       <p:ext uri="{BB962C8B-B14F-4D97-AF65-F5344CB8AC3E}">
-        <p14:creationId xmlns:p14="http://schemas.microsoft.com/office/powerpoint/2010/main" val="1868278654"/>
+        <p14:creationId xmlns:p14="http://schemas.microsoft.com/office/powerpoint/2010/main" val="2124745853"/>
       </p:ext>
     </p:extLst>
   </p:cSld>
@@ -4643,8 +4653,8 @@
           <a:lstStyle/>
           <a:p>
             <a:r>
-              <a:rPr lang="en-US" smtClean="0"/>
-              <a:t>What we learned</a:t>
+              <a:rPr lang="en-US" dirty="0" smtClean="0"/>
+              <a:t>Course is a set of Worked Examples</a:t>
             </a:r>
             <a:endParaRPr lang="en-US" dirty="0"/>
           </a:p>
@@ -4662,39 +4672,185 @@
         </p:nvSpPr>
         <p:spPr/>
         <p:txBody>
-          <a:bodyPr/>
-          <a:lstStyle/>
-          <a:p>
-            <a:r>
-              <a:rPr lang="en-US" smtClean="0"/>
-              <a:t>Labs work well</a:t>
-            </a:r>
-          </a:p>
-          <a:p>
-            <a:r>
-              <a:rPr lang="en-US" smtClean="0"/>
-              <a:t>Re-use the students’ example code</a:t>
-            </a:r>
-          </a:p>
-          <a:p>
-            <a:r>
-              <a:rPr lang="en-US" smtClean="0"/>
-              <a:t>VM sare better for a time constrained class</a:t>
-            </a:r>
-          </a:p>
-          <a:p>
-            <a:r>
-              <a:rPr lang="en-US" smtClean="0"/>
-              <a:t>Difficult to talk about performance with VMs alone</a:t>
-            </a:r>
-            <a:endParaRPr lang="en-US" dirty="0"/>
+          <a:bodyPr>
+            <a:noAutofit/>
+          </a:bodyPr>
+          <a:lstStyle/>
+          <a:p>
+            <a:r>
+              <a:rPr lang="en-US" sz="1800" dirty="0" smtClean="0"/>
+              <a:t>What names are being looked up?</a:t>
+            </a:r>
+          </a:p>
+          <a:p>
+            <a:endParaRPr lang="en-US" sz="1800" dirty="0" smtClean="0"/>
+          </a:p>
+          <a:p>
+            <a:r>
+              <a:rPr lang="en-US" sz="1800" dirty="0" err="1" smtClean="0"/>
+              <a:t>dtrace</a:t>
+            </a:r>
+            <a:r>
+              <a:rPr lang="en-US" sz="1800" dirty="0" smtClean="0"/>
+              <a:t> -n ’</a:t>
+            </a:r>
+            <a:r>
+              <a:rPr lang="en-US" sz="1800" dirty="0" err="1" smtClean="0"/>
+              <a:t>vfs:namei:lookup:entry</a:t>
+            </a:r>
+            <a:r>
+              <a:rPr lang="en-US" sz="1800" dirty="0" smtClean="0"/>
+              <a:t> \</a:t>
+            </a:r>
+          </a:p>
+          <a:p>
+            <a:r>
+              <a:rPr lang="de-DE" sz="1800" dirty="0" smtClean="0"/>
+              <a:t>        { </a:t>
+            </a:r>
+            <a:r>
+              <a:rPr lang="de-DE" sz="1800" dirty="0" err="1" smtClean="0"/>
+              <a:t>printf</a:t>
+            </a:r>
+            <a:r>
+              <a:rPr lang="de-DE" sz="1800" dirty="0" smtClean="0"/>
+              <a:t>("%s", </a:t>
+            </a:r>
+            <a:r>
+              <a:rPr lang="de-DE" sz="1800" dirty="0" err="1" smtClean="0"/>
+              <a:t>stringof</a:t>
+            </a:r>
+            <a:r>
+              <a:rPr lang="de-DE" sz="1800" dirty="0" smtClean="0"/>
+              <a:t>(arg1));}’</a:t>
+            </a:r>
+          </a:p>
+          <a:p>
+            <a:r>
+              <a:rPr lang="de-DE" sz="1800" dirty="0" smtClean="0"/>
+              <a:t>CPU     ID FUNCTION:NAME</a:t>
+            </a:r>
+          </a:p>
+          <a:p>
+            <a:r>
+              <a:rPr lang="de-DE" sz="1800" dirty="0" smtClean="0"/>
+              <a:t>  2  27847 </a:t>
+            </a:r>
+            <a:r>
+              <a:rPr lang="de-DE" sz="1800" dirty="0" err="1" smtClean="0"/>
+              <a:t>lookup:entry</a:t>
+            </a:r>
+            <a:r>
+              <a:rPr lang="de-DE" sz="1800" dirty="0" smtClean="0"/>
+              <a:t> /bin/</a:t>
+            </a:r>
+            <a:r>
+              <a:rPr lang="de-DE" sz="1800" dirty="0" err="1" smtClean="0"/>
+              <a:t>ls</a:t>
+            </a:r>
+            <a:endParaRPr lang="de-DE" sz="1800" dirty="0" smtClean="0"/>
+          </a:p>
+          <a:p>
+            <a:r>
+              <a:rPr lang="de-DE" sz="1800" dirty="0" smtClean="0"/>
+              <a:t>  2  27847 </a:t>
+            </a:r>
+            <a:r>
+              <a:rPr lang="de-DE" sz="1800" dirty="0" err="1" smtClean="0"/>
+              <a:t>lookup:entry</a:t>
+            </a:r>
+            <a:r>
+              <a:rPr lang="de-DE" sz="1800" dirty="0" smtClean="0"/>
+              <a:t> /</a:t>
+            </a:r>
+            <a:r>
+              <a:rPr lang="de-DE" sz="1800" dirty="0" err="1" smtClean="0"/>
+              <a:t>libexec</a:t>
+            </a:r>
+            <a:r>
+              <a:rPr lang="de-DE" sz="1800" dirty="0" smtClean="0"/>
+              <a:t>/ld-elf.so.1</a:t>
+            </a:r>
+          </a:p>
+          <a:p>
+            <a:r>
+              <a:rPr lang="de-DE" sz="1800" dirty="0" smtClean="0"/>
+              <a:t>  2  27847 </a:t>
+            </a:r>
+            <a:r>
+              <a:rPr lang="de-DE" sz="1800" dirty="0" err="1" smtClean="0"/>
+              <a:t>lookup:entry</a:t>
+            </a:r>
+            <a:r>
+              <a:rPr lang="de-DE" sz="1800" dirty="0" smtClean="0"/>
+              <a:t> /</a:t>
+            </a:r>
+            <a:r>
+              <a:rPr lang="de-DE" sz="1800" dirty="0" err="1" smtClean="0"/>
+              <a:t>etc</a:t>
+            </a:r>
+            <a:endParaRPr lang="de-DE" sz="1800" dirty="0" smtClean="0"/>
+          </a:p>
+          <a:p>
+            <a:r>
+              <a:rPr lang="de-DE" sz="1800" dirty="0" smtClean="0"/>
+              <a:t>  2  27847 </a:t>
+            </a:r>
+            <a:r>
+              <a:rPr lang="de-DE" sz="1800" dirty="0" err="1" smtClean="0"/>
+              <a:t>lookup:entry</a:t>
+            </a:r>
+            <a:r>
+              <a:rPr lang="de-DE" sz="1800" dirty="0" smtClean="0"/>
+              <a:t> /</a:t>
+            </a:r>
+            <a:r>
+              <a:rPr lang="de-DE" sz="1800" dirty="0" err="1" smtClean="0"/>
+              <a:t>etc</a:t>
+            </a:r>
+            <a:r>
+              <a:rPr lang="de-DE" sz="1800" dirty="0" smtClean="0"/>
+              <a:t>/</a:t>
+            </a:r>
+            <a:r>
+              <a:rPr lang="de-DE" sz="1800" dirty="0" err="1" smtClean="0"/>
+              <a:t>libmap.conf</a:t>
+            </a:r>
+            <a:endParaRPr lang="de-DE" sz="1800" dirty="0" smtClean="0"/>
+          </a:p>
+          <a:p>
+            <a:r>
+              <a:rPr lang="de-DE" sz="1800" dirty="0" smtClean="0"/>
+              <a:t>  2  27847 </a:t>
+            </a:r>
+            <a:r>
+              <a:rPr lang="de-DE" sz="1800" dirty="0" err="1" smtClean="0"/>
+              <a:t>lookup:entry</a:t>
+            </a:r>
+            <a:r>
+              <a:rPr lang="de-DE" sz="1800" dirty="0" smtClean="0"/>
+              <a:t> /</a:t>
+            </a:r>
+            <a:r>
+              <a:rPr lang="de-DE" sz="1800" dirty="0" err="1" smtClean="0"/>
+              <a:t>etc</a:t>
+            </a:r>
+            <a:r>
+              <a:rPr lang="de-DE" sz="1800" dirty="0" smtClean="0"/>
+              <a:t>/</a:t>
+            </a:r>
+            <a:r>
+              <a:rPr lang="de-DE" sz="1800" dirty="0" err="1" smtClean="0"/>
+              <a:t>libmap.conf</a:t>
+            </a:r>
+            <a:endParaRPr lang="de-DE" sz="1800" dirty="0" smtClean="0"/>
           </a:p>
         </p:txBody>
       </p:sp>
     </p:spTree>
     <p:extLst>
       <p:ext uri="{BB962C8B-B14F-4D97-AF65-F5344CB8AC3E}">
-        <p14:creationId xmlns:p14="http://schemas.microsoft.com/office/powerpoint/2010/main" val="1800934991"/>
+        <p14:creationId xmlns:p14="http://schemas.microsoft.com/office/powerpoint/2010/main" val="1868278654"/>
       </p:ext>
     </p:extLst>
   </p:cSld>
@@ -4745,7 +4901,7 @@
           <a:p>
             <a:r>
               <a:rPr lang="en-US" dirty="0" smtClean="0"/>
-              <a:t>Audiences</a:t>
+              <a:t>Motivations</a:t>
             </a:r>
             <a:endParaRPr lang="en-US" dirty="0"/>
           </a:p>
@@ -4768,61 +4924,25 @@
           <a:p>
             <a:r>
               <a:rPr lang="en-US" dirty="0" smtClean="0"/>
-              <a:t>Practitioners</a:t>
-            </a:r>
-          </a:p>
-          <a:p>
-            <a:pPr lvl="1"/>
-            <a:r>
-              <a:rPr lang="en-US" dirty="0" smtClean="0"/>
-              <a:t>Experience with some programming language</a:t>
-            </a:r>
-          </a:p>
-          <a:p>
-            <a:pPr lvl="1"/>
-            <a:r>
-              <a:rPr lang="en-US" dirty="0" smtClean="0"/>
-              <a:t>Work experience</a:t>
-            </a:r>
-          </a:p>
-          <a:p>
-            <a:r>
-              <a:rPr lang="en-US" dirty="0" smtClean="0"/>
-              <a:t>Masters Students in Computer Science</a:t>
-            </a:r>
-          </a:p>
-          <a:p>
-            <a:pPr lvl="1"/>
-            <a:r>
-              <a:rPr lang="en-US" dirty="0" smtClean="0"/>
-              <a:t>May not have an undergrad CS degree</a:t>
-            </a:r>
-          </a:p>
-          <a:p>
-            <a:pPr lvl="1"/>
-            <a:r>
-              <a:rPr lang="en-US" dirty="0" smtClean="0"/>
-              <a:t>Focus is on research skills</a:t>
-            </a:r>
-          </a:p>
-          <a:p>
-            <a:r>
-              <a:rPr lang="en-US" dirty="0" smtClean="0"/>
-              <a:t>Undergraduates in Computer Science</a:t>
-            </a:r>
-          </a:p>
-          <a:p>
-            <a:pPr lvl="1"/>
-            <a:r>
-              <a:rPr lang="en-US" dirty="0" smtClean="0"/>
-              <a:t>Highest variability in background</a:t>
-            </a:r>
-          </a:p>
-          <a:p>
-            <a:pPr lvl="1"/>
-            <a:r>
-              <a:rPr lang="en-US" dirty="0" smtClean="0"/>
-              <a:t>May not know C</a:t>
+              <a:t>Promulgate the understanding of large and complex systems</a:t>
+            </a:r>
+          </a:p>
+          <a:p>
+            <a:r>
+              <a:rPr lang="en-US" dirty="0" smtClean="0"/>
+              <a:t>Bring modern tools to a wide variety of audiences</a:t>
+            </a:r>
+          </a:p>
+          <a:p>
+            <a:r>
+              <a:rPr lang="en-US" dirty="0" smtClean="0"/>
+              <a:t>Advance the practice of software and systems engineering</a:t>
+            </a:r>
+          </a:p>
+          <a:p>
+            <a:r>
+              <a:rPr lang="en-US" dirty="0" smtClean="0"/>
+              <a:t>Promote FreeBSD as a platform for teaching, research and development</a:t>
             </a:r>
           </a:p>
         </p:txBody>
@@ -4830,13 +4950,20 @@
     </p:spTree>
     <p:extLst>
       <p:ext uri="{BB962C8B-B14F-4D97-AF65-F5344CB8AC3E}">
-        <p14:creationId xmlns:p14="http://schemas.microsoft.com/office/powerpoint/2010/main" val="1710415718"/>
+        <p14:creationId xmlns:p14="http://schemas.microsoft.com/office/powerpoint/2010/main" val="2083612166"/>
       </p:ext>
     </p:extLst>
   </p:cSld>
   <p:clrMapOvr>
     <a:masterClrMapping/>
   </p:clrMapOvr>
+  <p:timing>
+    <p:tnLst>
+      <p:par>
+        <p:cTn id="1" dur="indefinite" restart="never" nodeType="tmRoot"/>
+      </p:par>
+    </p:tnLst>
+  </p:timing>
 </p:sld>
 </file>
 
@@ -4873,8 +5000,8 @@
           <a:lstStyle/>
           <a:p>
             <a:r>
-              <a:rPr lang="en-US" dirty="0" smtClean="0"/>
-              <a:t>Teaching Undergraduates</a:t>
+              <a:rPr lang="en-US" smtClean="0"/>
+              <a:t>What we learned</a:t>
             </a:r>
             <a:endParaRPr lang="en-US" dirty="0"/>
           </a:p>
@@ -4897,41 +5024,30 @@
           <a:p>
             <a:r>
               <a:rPr lang="en-US" dirty="0" smtClean="0"/>
-              <a:t>Requires a far more background material</a:t>
-            </a:r>
-          </a:p>
-          <a:p>
-            <a:r>
-              <a:rPr lang="en-US" dirty="0" smtClean="0"/>
-              <a:t>Need to focus on the </a:t>
-            </a:r>
-            <a:r>
-              <a:rPr lang="en-US" i="1" dirty="0" smtClean="0"/>
-              <a:t>why</a:t>
-            </a:r>
-            <a:r>
-              <a:rPr lang="en-US" dirty="0" smtClean="0"/>
-              <a:t> as well as the </a:t>
-            </a:r>
-            <a:r>
-              <a:rPr lang="en-US" i="1" dirty="0" smtClean="0"/>
-              <a:t>what</a:t>
-            </a:r>
-            <a:endParaRPr lang="en-US" dirty="0" smtClean="0"/>
-          </a:p>
-          <a:p>
-            <a:r>
-              <a:rPr lang="en-US" dirty="0" smtClean="0"/>
-              <a:t>Pacing is key to understanding</a:t>
-            </a:r>
-          </a:p>
-          <a:p>
-            <a:r>
-              <a:rPr lang="en-US" dirty="0" smtClean="0"/>
-              <a:t>Repetition is required</a:t>
-            </a:r>
-          </a:p>
-          <a:p>
+              <a:t>Labs work well</a:t>
+            </a:r>
+          </a:p>
+          <a:p>
+            <a:r>
+              <a:rPr lang="en-US" dirty="0" smtClean="0"/>
+              <a:t>Re-use the students’ example code</a:t>
+            </a:r>
+          </a:p>
+          <a:p>
+            <a:r>
+              <a:rPr lang="en-US" dirty="0" smtClean="0"/>
+              <a:t>VMs are </a:t>
+            </a:r>
+            <a:r>
+              <a:rPr lang="en-US" dirty="0" smtClean="0"/>
+              <a:t>better for a time constrained class</a:t>
+            </a:r>
+          </a:p>
+          <a:p>
+            <a:r>
+              <a:rPr lang="en-US" dirty="0" smtClean="0"/>
+              <a:t>Difficult to talk about performance with VMs alone</a:t>
+            </a:r>
             <a:endParaRPr lang="en-US" dirty="0"/>
           </a:p>
         </p:txBody>
@@ -4939,13 +5055,20 @@
     </p:spTree>
     <p:extLst>
       <p:ext uri="{BB962C8B-B14F-4D97-AF65-F5344CB8AC3E}">
-        <p14:creationId xmlns:p14="http://schemas.microsoft.com/office/powerpoint/2010/main" val="1217660385"/>
+        <p14:creationId xmlns:p14="http://schemas.microsoft.com/office/powerpoint/2010/main" val="1800934991"/>
       </p:ext>
     </p:extLst>
   </p:cSld>
   <p:clrMapOvr>
     <a:masterClrMapping/>
   </p:clrMapOvr>
+  <p:timing>
+    <p:tnLst>
+      <p:par>
+        <p:cTn id="1" dur="indefinite" restart="never" nodeType="tmRoot"/>
+      </p:par>
+    </p:tnLst>
+  </p:timing>
 </p:sld>
 </file>
 
@@ -4983,6 +5106,134 @@
           <a:p>
             <a:r>
               <a:rPr lang="en-US" dirty="0" smtClean="0"/>
+              <a:t>Teaching Undergraduates</a:t>
+            </a:r>
+            <a:endParaRPr lang="en-US" dirty="0"/>
+          </a:p>
+        </p:txBody>
+      </p:sp>
+      <p:sp>
+        <p:nvSpPr>
+          <p:cNvPr id="3" name="Content Placeholder 2"/>
+          <p:cNvSpPr>
+            <a:spLocks noGrp="1"/>
+          </p:cNvSpPr>
+          <p:nvPr>
+            <p:ph idx="1"/>
+          </p:nvPr>
+        </p:nvSpPr>
+        <p:spPr/>
+        <p:txBody>
+          <a:bodyPr/>
+          <a:lstStyle/>
+          <a:p>
+            <a:r>
+              <a:rPr lang="en-US" dirty="0" smtClean="0"/>
+              <a:t>Requires a far more background material</a:t>
+            </a:r>
+          </a:p>
+          <a:p>
+            <a:r>
+              <a:rPr lang="en-US" dirty="0" smtClean="0"/>
+              <a:t>Need to focus on the </a:t>
+            </a:r>
+            <a:r>
+              <a:rPr lang="en-US" i="1" dirty="0" smtClean="0"/>
+              <a:t>why</a:t>
+            </a:r>
+            <a:r>
+              <a:rPr lang="en-US" dirty="0" smtClean="0"/>
+              <a:t> as well as the </a:t>
+            </a:r>
+            <a:r>
+              <a:rPr lang="en-US" i="1" dirty="0" smtClean="0"/>
+              <a:t>what</a:t>
+            </a:r>
+            <a:endParaRPr lang="en-US" dirty="0" smtClean="0"/>
+          </a:p>
+          <a:p>
+            <a:r>
+              <a:rPr lang="en-US" dirty="0" smtClean="0"/>
+              <a:t>Pacing is key to understanding</a:t>
+            </a:r>
+          </a:p>
+          <a:p>
+            <a:r>
+              <a:rPr lang="en-US" dirty="0" smtClean="0"/>
+              <a:t>Repetition is required</a:t>
+            </a:r>
+          </a:p>
+          <a:p>
+            <a:r>
+              <a:rPr lang="en-US" dirty="0" smtClean="0"/>
+              <a:t>Teach the students how a large piece of systems software works</a:t>
+            </a:r>
+          </a:p>
+          <a:p>
+            <a:r>
+              <a:rPr lang="en-US" dirty="0" smtClean="0"/>
+              <a:t>Get them to understand how the whole system works</a:t>
+            </a:r>
+          </a:p>
+          <a:p>
+            <a:endParaRPr lang="en-US" dirty="0"/>
+          </a:p>
+        </p:txBody>
+      </p:sp>
+    </p:spTree>
+    <p:extLst>
+      <p:ext uri="{BB962C8B-B14F-4D97-AF65-F5344CB8AC3E}">
+        <p14:creationId xmlns:p14="http://schemas.microsoft.com/office/powerpoint/2010/main" val="1217660385"/>
+      </p:ext>
+    </p:extLst>
+  </p:cSld>
+  <p:clrMapOvr>
+    <a:masterClrMapping/>
+  </p:clrMapOvr>
+  <p:timing>
+    <p:tnLst>
+      <p:par>
+        <p:cTn id="1" dur="indefinite" restart="never" nodeType="tmRoot"/>
+      </p:par>
+    </p:tnLst>
+  </p:timing>
+</p:sld>
+</file>
+
+<file path=ppt/slides/slide22.xml><?xml version="1.0" encoding="utf-8"?>
+<p:sld xmlns:a="http://schemas.openxmlformats.org/drawingml/2006/main" xmlns:r="http://schemas.openxmlformats.org/officeDocument/2006/relationships" xmlns:p="http://schemas.openxmlformats.org/presentationml/2006/main">
+  <p:cSld>
+    <p:spTree>
+      <p:nvGrpSpPr>
+        <p:cNvPr id="1" name=""/>
+        <p:cNvGrpSpPr/>
+        <p:nvPr/>
+      </p:nvGrpSpPr>
+      <p:grpSpPr>
+        <a:xfrm>
+          <a:off x="0" y="0"/>
+          <a:ext cx="0" cy="0"/>
+          <a:chOff x="0" y="0"/>
+          <a:chExt cx="0" cy="0"/>
+        </a:xfrm>
+      </p:grpSpPr>
+      <p:sp>
+        <p:nvSpPr>
+          <p:cNvPr id="2" name="Title 1"/>
+          <p:cNvSpPr>
+            <a:spLocks noGrp="1"/>
+          </p:cNvSpPr>
+          <p:nvPr>
+            <p:ph type="title"/>
+          </p:nvPr>
+        </p:nvSpPr>
+        <p:spPr/>
+        <p:txBody>
+          <a:bodyPr/>
+          <a:lstStyle/>
+          <a:p>
+            <a:r>
+              <a:rPr lang="en-US" dirty="0" smtClean="0"/>
               <a:t>Deeper Background</a:t>
             </a:r>
             <a:endParaRPr lang="en-US" dirty="0"/>
@@ -5055,10 +5306,594 @@
   <p:clrMapOvr>
     <a:masterClrMapping/>
   </p:clrMapOvr>
+  <p:timing>
+    <p:tnLst>
+      <p:par>
+        <p:cTn id="1" dur="indefinite" restart="never" nodeType="tmRoot"/>
+      </p:par>
+    </p:tnLst>
+  </p:timing>
 </p:sld>
 </file>
 
-<file path=ppt/slides/slide22.xml><?xml version="1.0" encoding="utf-8"?>
+<file path=ppt/slides/slide23.xml><?xml version="1.0" encoding="utf-8"?>
+<p:sld xmlns:a="http://schemas.openxmlformats.org/drawingml/2006/main" xmlns:r="http://schemas.openxmlformats.org/officeDocument/2006/relationships" xmlns:p="http://schemas.openxmlformats.org/presentationml/2006/main">
+  <p:cSld>
+    <p:spTree>
+      <p:nvGrpSpPr>
+        <p:cNvPr id="1" name=""/>
+        <p:cNvGrpSpPr/>
+        <p:nvPr/>
+      </p:nvGrpSpPr>
+      <p:grpSpPr>
+        <a:xfrm>
+          <a:off x="0" y="0"/>
+          <a:ext cx="0" cy="0"/>
+          <a:chOff x="0" y="0"/>
+          <a:chExt cx="0" cy="0"/>
+        </a:xfrm>
+      </p:grpSpPr>
+      <p:sp>
+        <p:nvSpPr>
+          <p:cNvPr id="2" name="Title 1"/>
+          <p:cNvSpPr>
+            <a:spLocks noGrp="1"/>
+          </p:cNvSpPr>
+          <p:nvPr>
+            <p:ph type="title"/>
+          </p:nvPr>
+        </p:nvSpPr>
+        <p:spPr/>
+        <p:txBody>
+          <a:bodyPr/>
+          <a:lstStyle/>
+          <a:p>
+            <a:r>
+              <a:rPr lang="en-US" dirty="0" smtClean="0"/>
+              <a:t>How do you explain deadlock?</a:t>
+            </a:r>
+            <a:endParaRPr lang="en-US" dirty="0"/>
+          </a:p>
+        </p:txBody>
+      </p:sp>
+      <p:pic>
+        <p:nvPicPr>
+          <p:cNvPr id="10" name="Picture 9"/>
+          <p:cNvPicPr>
+            <a:picLocks noChangeAspect="1"/>
+          </p:cNvPicPr>
+          <p:nvPr/>
+        </p:nvPicPr>
+        <p:blipFill>
+          <a:blip r:embed="rId2">
+            <a:extLst>
+              <a:ext uri="{28A0092B-C50C-407E-A947-70E740481C1C}">
+                <a14:useLocalDpi xmlns:a14="http://schemas.microsoft.com/office/drawing/2010/main" val="0"/>
+              </a:ext>
+            </a:extLst>
+          </a:blip>
+          <a:stretch>
+            <a:fillRect/>
+          </a:stretch>
+        </p:blipFill>
+        <p:spPr>
+          <a:xfrm>
+            <a:off x="3689350" y="1690688"/>
+            <a:ext cx="4813300" cy="4203700"/>
+          </a:xfrm>
+          <a:prstGeom prst="rect">
+            <a:avLst/>
+          </a:prstGeom>
+        </p:spPr>
+      </p:pic>
+    </p:spTree>
+    <p:extLst>
+      <p:ext uri="{BB962C8B-B14F-4D97-AF65-F5344CB8AC3E}">
+        <p14:creationId xmlns:p14="http://schemas.microsoft.com/office/powerpoint/2010/main" val="1033212135"/>
+      </p:ext>
+    </p:extLst>
+  </p:cSld>
+  <p:clrMapOvr>
+    <a:masterClrMapping/>
+  </p:clrMapOvr>
+  <p:timing>
+    <p:tnLst>
+      <p:par>
+        <p:cTn id="1" dur="indefinite" restart="never" nodeType="tmRoot"/>
+      </p:par>
+    </p:tnLst>
+  </p:timing>
+</p:sld>
+</file>
+
+<file path=ppt/slides/slide24.xml><?xml version="1.0" encoding="utf-8"?>
+<p:sld xmlns:a="http://schemas.openxmlformats.org/drawingml/2006/main" xmlns:r="http://schemas.openxmlformats.org/officeDocument/2006/relationships" xmlns:p="http://schemas.openxmlformats.org/presentationml/2006/main">
+  <p:cSld>
+    <p:spTree>
+      <p:nvGrpSpPr>
+        <p:cNvPr id="1" name=""/>
+        <p:cNvGrpSpPr/>
+        <p:nvPr/>
+      </p:nvGrpSpPr>
+      <p:grpSpPr>
+        <a:xfrm>
+          <a:off x="0" y="0"/>
+          <a:ext cx="0" cy="0"/>
+          <a:chOff x="0" y="0"/>
+          <a:chExt cx="0" cy="0"/>
+        </a:xfrm>
+      </p:grpSpPr>
+      <p:sp>
+        <p:nvSpPr>
+          <p:cNvPr id="2" name="Title 1"/>
+          <p:cNvSpPr>
+            <a:spLocks noGrp="1"/>
+          </p:cNvSpPr>
+          <p:nvPr>
+            <p:ph type="title"/>
+          </p:nvPr>
+        </p:nvSpPr>
+        <p:spPr/>
+        <p:txBody>
+          <a:bodyPr/>
+          <a:lstStyle/>
+          <a:p>
+            <a:r>
+              <a:rPr lang="en-US" dirty="0" smtClean="0"/>
+              <a:t>How do you explain deadlock?</a:t>
+            </a:r>
+            <a:endParaRPr lang="en-US" dirty="0"/>
+          </a:p>
+        </p:txBody>
+      </p:sp>
+      <p:pic>
+        <p:nvPicPr>
+          <p:cNvPr id="10" name="Picture 9"/>
+          <p:cNvPicPr>
+            <a:picLocks noChangeAspect="1"/>
+          </p:cNvPicPr>
+          <p:nvPr/>
+        </p:nvPicPr>
+        <p:blipFill>
+          <a:blip r:embed="rId2">
+            <a:extLst>
+              <a:ext uri="{28A0092B-C50C-407E-A947-70E740481C1C}">
+                <a14:useLocalDpi xmlns:a14="http://schemas.microsoft.com/office/drawing/2010/main" val="0"/>
+              </a:ext>
+            </a:extLst>
+          </a:blip>
+          <a:stretch>
+            <a:fillRect/>
+          </a:stretch>
+        </p:blipFill>
+        <p:spPr>
+          <a:xfrm>
+            <a:off x="3377048" y="2140545"/>
+            <a:ext cx="5437903" cy="3522398"/>
+          </a:xfrm>
+          <a:prstGeom prst="rect">
+            <a:avLst/>
+          </a:prstGeom>
+        </p:spPr>
+      </p:pic>
+    </p:spTree>
+    <p:extLst>
+      <p:ext uri="{BB962C8B-B14F-4D97-AF65-F5344CB8AC3E}">
+        <p14:creationId xmlns:p14="http://schemas.microsoft.com/office/powerpoint/2010/main" val="1633844965"/>
+      </p:ext>
+    </p:extLst>
+  </p:cSld>
+  <p:clrMapOvr>
+    <a:masterClrMapping/>
+  </p:clrMapOvr>
+  <p:timing>
+    <p:tnLst>
+      <p:par>
+        <p:cTn id="1" dur="indefinite" restart="never" nodeType="tmRoot"/>
+      </p:par>
+    </p:tnLst>
+  </p:timing>
+</p:sld>
+</file>
+
+<file path=ppt/slides/slide25.xml><?xml version="1.0" encoding="utf-8"?>
+<p:sld xmlns:a="http://schemas.openxmlformats.org/drawingml/2006/main" xmlns:r="http://schemas.openxmlformats.org/officeDocument/2006/relationships" xmlns:p="http://schemas.openxmlformats.org/presentationml/2006/main">
+  <p:cSld>
+    <p:spTree>
+      <p:nvGrpSpPr>
+        <p:cNvPr id="1" name=""/>
+        <p:cNvGrpSpPr/>
+        <p:nvPr/>
+      </p:nvGrpSpPr>
+      <p:grpSpPr>
+        <a:xfrm>
+          <a:off x="0" y="0"/>
+          <a:ext cx="0" cy="0"/>
+          <a:chOff x="0" y="0"/>
+          <a:chExt cx="0" cy="0"/>
+        </a:xfrm>
+      </p:grpSpPr>
+      <p:sp>
+        <p:nvSpPr>
+          <p:cNvPr id="2" name="Title 1"/>
+          <p:cNvSpPr>
+            <a:spLocks noGrp="1"/>
+          </p:cNvSpPr>
+          <p:nvPr>
+            <p:ph type="title"/>
+          </p:nvPr>
+        </p:nvSpPr>
+        <p:spPr/>
+        <p:txBody>
+          <a:bodyPr/>
+          <a:lstStyle/>
+          <a:p>
+            <a:r>
+              <a:rPr lang="en-US" dirty="0" smtClean="0"/>
+              <a:t>How do you explain deadlock?</a:t>
+            </a:r>
+            <a:endParaRPr lang="en-US" dirty="0"/>
+          </a:p>
+        </p:txBody>
+      </p:sp>
+      <p:pic>
+        <p:nvPicPr>
+          <p:cNvPr id="10" name="Picture 9"/>
+          <p:cNvPicPr>
+            <a:picLocks noChangeAspect="1"/>
+          </p:cNvPicPr>
+          <p:nvPr/>
+        </p:nvPicPr>
+        <p:blipFill>
+          <a:blip r:embed="rId2">
+            <a:extLst>
+              <a:ext uri="{28A0092B-C50C-407E-A947-70E740481C1C}">
+                <a14:useLocalDpi xmlns:a14="http://schemas.microsoft.com/office/drawing/2010/main" val="0"/>
+              </a:ext>
+            </a:extLst>
+          </a:blip>
+          <a:stretch>
+            <a:fillRect/>
+          </a:stretch>
+        </p:blipFill>
+        <p:spPr>
+          <a:xfrm>
+            <a:off x="2149014" y="2401557"/>
+            <a:ext cx="7893971" cy="2810546"/>
+          </a:xfrm>
+          <a:prstGeom prst="rect">
+            <a:avLst/>
+          </a:prstGeom>
+        </p:spPr>
+      </p:pic>
+    </p:spTree>
+    <p:extLst>
+      <p:ext uri="{BB962C8B-B14F-4D97-AF65-F5344CB8AC3E}">
+        <p14:creationId xmlns:p14="http://schemas.microsoft.com/office/powerpoint/2010/main" val="1857463541"/>
+      </p:ext>
+    </p:extLst>
+  </p:cSld>
+  <p:clrMapOvr>
+    <a:masterClrMapping/>
+  </p:clrMapOvr>
+  <p:timing>
+    <p:tnLst>
+      <p:par>
+        <p:cTn id="1" dur="indefinite" restart="never" nodeType="tmRoot"/>
+      </p:par>
+    </p:tnLst>
+  </p:timing>
+</p:sld>
+</file>
+
+<file path=ppt/slides/slide26.xml><?xml version="1.0" encoding="utf-8"?>
+<p:sld xmlns:a="http://schemas.openxmlformats.org/drawingml/2006/main" xmlns:r="http://schemas.openxmlformats.org/officeDocument/2006/relationships" xmlns:p="http://schemas.openxmlformats.org/presentationml/2006/main">
+  <p:cSld>
+    <p:spTree>
+      <p:nvGrpSpPr>
+        <p:cNvPr id="1" name=""/>
+        <p:cNvGrpSpPr/>
+        <p:nvPr/>
+      </p:nvGrpSpPr>
+      <p:grpSpPr>
+        <a:xfrm>
+          <a:off x="0" y="0"/>
+          <a:ext cx="0" cy="0"/>
+          <a:chOff x="0" y="0"/>
+          <a:chExt cx="0" cy="0"/>
+        </a:xfrm>
+      </p:grpSpPr>
+      <p:sp>
+        <p:nvSpPr>
+          <p:cNvPr id="2" name="Title 1"/>
+          <p:cNvSpPr>
+            <a:spLocks noGrp="1"/>
+          </p:cNvSpPr>
+          <p:nvPr>
+            <p:ph type="title"/>
+          </p:nvPr>
+        </p:nvSpPr>
+        <p:spPr/>
+        <p:txBody>
+          <a:bodyPr/>
+          <a:lstStyle/>
+          <a:p>
+            <a:r>
+              <a:rPr lang="en-US" dirty="0" smtClean="0"/>
+              <a:t>How do you explain deadlock?</a:t>
+            </a:r>
+            <a:endParaRPr lang="en-US" dirty="0"/>
+          </a:p>
+        </p:txBody>
+      </p:sp>
+      <p:pic>
+        <p:nvPicPr>
+          <p:cNvPr id="10" name="Picture 9"/>
+          <p:cNvPicPr>
+            <a:picLocks noChangeAspect="1"/>
+          </p:cNvPicPr>
+          <p:nvPr/>
+        </p:nvPicPr>
+        <p:blipFill>
+          <a:blip r:embed="rId2">
+            <a:extLst>
+              <a:ext uri="{28A0092B-C50C-407E-A947-70E740481C1C}">
+                <a14:useLocalDpi xmlns:a14="http://schemas.microsoft.com/office/drawing/2010/main" val="0"/>
+              </a:ext>
+            </a:extLst>
+          </a:blip>
+          <a:stretch>
+            <a:fillRect/>
+          </a:stretch>
+        </p:blipFill>
+        <p:spPr>
+          <a:xfrm>
+            <a:off x="2706244" y="1865468"/>
+            <a:ext cx="6779511" cy="3673109"/>
+          </a:xfrm>
+          <a:prstGeom prst="rect">
+            <a:avLst/>
+          </a:prstGeom>
+        </p:spPr>
+      </p:pic>
+    </p:spTree>
+    <p:extLst>
+      <p:ext uri="{BB962C8B-B14F-4D97-AF65-F5344CB8AC3E}">
+        <p14:creationId xmlns:p14="http://schemas.microsoft.com/office/powerpoint/2010/main" val="1588522394"/>
+      </p:ext>
+    </p:extLst>
+  </p:cSld>
+  <p:clrMapOvr>
+    <a:masterClrMapping/>
+  </p:clrMapOvr>
+  <p:timing>
+    <p:tnLst>
+      <p:par>
+        <p:cTn id="1" dur="indefinite" restart="never" nodeType="tmRoot"/>
+      </p:par>
+    </p:tnLst>
+  </p:timing>
+</p:sld>
+</file>
+
+<file path=ppt/slides/slide27.xml><?xml version="1.0" encoding="utf-8"?>
+<p:sld xmlns:a="http://schemas.openxmlformats.org/drawingml/2006/main" xmlns:r="http://schemas.openxmlformats.org/officeDocument/2006/relationships" xmlns:p="http://schemas.openxmlformats.org/presentationml/2006/main">
+  <p:cSld>
+    <p:spTree>
+      <p:nvGrpSpPr>
+        <p:cNvPr id="1" name=""/>
+        <p:cNvGrpSpPr/>
+        <p:nvPr/>
+      </p:nvGrpSpPr>
+      <p:grpSpPr>
+        <a:xfrm>
+          <a:off x="0" y="0"/>
+          <a:ext cx="0" cy="0"/>
+          <a:chOff x="0" y="0"/>
+          <a:chExt cx="0" cy="0"/>
+        </a:xfrm>
+      </p:grpSpPr>
+      <p:sp>
+        <p:nvSpPr>
+          <p:cNvPr id="2" name="Title 1"/>
+          <p:cNvSpPr>
+            <a:spLocks noGrp="1"/>
+          </p:cNvSpPr>
+          <p:nvPr>
+            <p:ph type="title"/>
+          </p:nvPr>
+        </p:nvSpPr>
+        <p:spPr/>
+        <p:txBody>
+          <a:bodyPr/>
+          <a:lstStyle/>
+          <a:p>
+            <a:r>
+              <a:rPr lang="en-US" dirty="0" smtClean="0"/>
+              <a:t>How do you explain deadlock?</a:t>
+            </a:r>
+            <a:endParaRPr lang="en-US" dirty="0"/>
+          </a:p>
+        </p:txBody>
+      </p:sp>
+      <p:pic>
+        <p:nvPicPr>
+          <p:cNvPr id="10" name="Picture 9"/>
+          <p:cNvPicPr>
+            <a:picLocks noChangeAspect="1"/>
+          </p:cNvPicPr>
+          <p:nvPr/>
+        </p:nvPicPr>
+        <p:blipFill>
+          <a:blip r:embed="rId2">
+            <a:extLst>
+              <a:ext uri="{28A0092B-C50C-407E-A947-70E740481C1C}">
+                <a14:useLocalDpi xmlns:a14="http://schemas.microsoft.com/office/drawing/2010/main" val="0"/>
+              </a:ext>
+            </a:extLst>
+          </a:blip>
+          <a:stretch>
+            <a:fillRect/>
+          </a:stretch>
+        </p:blipFill>
+        <p:spPr>
+          <a:xfrm>
+            <a:off x="2936752" y="1690688"/>
+            <a:ext cx="6318496" cy="4274276"/>
+          </a:xfrm>
+          <a:prstGeom prst="rect">
+            <a:avLst/>
+          </a:prstGeom>
+        </p:spPr>
+      </p:pic>
+    </p:spTree>
+    <p:extLst>
+      <p:ext uri="{BB962C8B-B14F-4D97-AF65-F5344CB8AC3E}">
+        <p14:creationId xmlns:p14="http://schemas.microsoft.com/office/powerpoint/2010/main" val="779176454"/>
+      </p:ext>
+    </p:extLst>
+  </p:cSld>
+  <p:clrMapOvr>
+    <a:masterClrMapping/>
+  </p:clrMapOvr>
+  <p:timing>
+    <p:tnLst>
+      <p:par>
+        <p:cTn id="1" dur="indefinite" restart="never" nodeType="tmRoot"/>
+      </p:par>
+    </p:tnLst>
+  </p:timing>
+</p:sld>
+</file>
+
+<file path=ppt/slides/slide28.xml><?xml version="1.0" encoding="utf-8"?>
+<p:sld xmlns:a="http://schemas.openxmlformats.org/drawingml/2006/main" xmlns:r="http://schemas.openxmlformats.org/officeDocument/2006/relationships" xmlns:p="http://schemas.openxmlformats.org/presentationml/2006/main">
+  <p:cSld>
+    <p:spTree>
+      <p:nvGrpSpPr>
+        <p:cNvPr id="1" name=""/>
+        <p:cNvGrpSpPr/>
+        <p:nvPr/>
+      </p:nvGrpSpPr>
+      <p:grpSpPr>
+        <a:xfrm>
+          <a:off x="0" y="0"/>
+          <a:ext cx="0" cy="0"/>
+          <a:chOff x="0" y="0"/>
+          <a:chExt cx="0" cy="0"/>
+        </a:xfrm>
+      </p:grpSpPr>
+      <p:sp>
+        <p:nvSpPr>
+          <p:cNvPr id="2" name="Title 1"/>
+          <p:cNvSpPr>
+            <a:spLocks noGrp="1"/>
+          </p:cNvSpPr>
+          <p:nvPr>
+            <p:ph type="title"/>
+          </p:nvPr>
+        </p:nvSpPr>
+        <p:spPr/>
+        <p:txBody>
+          <a:bodyPr/>
+          <a:lstStyle/>
+          <a:p>
+            <a:r>
+              <a:rPr lang="en-US" dirty="0" smtClean="0"/>
+              <a:t>Questions we expect them to answer</a:t>
+            </a:r>
+            <a:endParaRPr lang="en-US" dirty="0"/>
+          </a:p>
+        </p:txBody>
+      </p:sp>
+      <p:sp>
+        <p:nvSpPr>
+          <p:cNvPr id="3" name="Content Placeholder 2"/>
+          <p:cNvSpPr>
+            <a:spLocks noGrp="1"/>
+          </p:cNvSpPr>
+          <p:nvPr>
+            <p:ph idx="1"/>
+          </p:nvPr>
+        </p:nvSpPr>
+        <p:spPr/>
+        <p:txBody>
+          <a:bodyPr/>
+          <a:lstStyle/>
+          <a:p>
+            <a:r>
+              <a:rPr lang="en-US" dirty="0" smtClean="0"/>
+              <a:t>Name three pieces of software found in the kernel</a:t>
+            </a:r>
+          </a:p>
+          <a:p>
+            <a:r>
+              <a:rPr lang="en-US" dirty="0" smtClean="0"/>
+              <a:t>Name three pieces of software found in user space</a:t>
+            </a:r>
+          </a:p>
+          <a:p>
+            <a:r>
+              <a:rPr lang="en-US" dirty="0" smtClean="0"/>
+              <a:t>What states does a process go during the process  life cycle?</a:t>
+            </a:r>
+          </a:p>
+          <a:p>
+            <a:r>
+              <a:rPr lang="en-US" dirty="0" smtClean="0"/>
+              <a:t>Draw a diagram of two threads that are deadlocked.</a:t>
+            </a:r>
+          </a:p>
+          <a:p>
+            <a:r>
+              <a:rPr lang="en-US" dirty="0" smtClean="0"/>
+              <a:t>Write a </a:t>
+            </a:r>
+            <a:r>
+              <a:rPr lang="en-US" dirty="0" err="1" smtClean="0"/>
+              <a:t>DTrace</a:t>
+            </a:r>
+            <a:r>
+              <a:rPr lang="en-US" dirty="0" smtClean="0"/>
+              <a:t> one-liner that captures sockets entering  the fin-wait-1 state</a:t>
+            </a:r>
+          </a:p>
+          <a:p>
+            <a:r>
+              <a:rPr lang="en-US" dirty="0" smtClean="0"/>
+              <a:t>Why does the name cache store negative entries?</a:t>
+            </a:r>
+          </a:p>
+          <a:p>
+            <a:r>
+              <a:rPr lang="en-US" i="1" dirty="0" smtClean="0"/>
+              <a:t>What happens when you load a web page?</a:t>
+            </a:r>
+            <a:endParaRPr lang="en-US" i="1" dirty="0"/>
+          </a:p>
+        </p:txBody>
+      </p:sp>
+    </p:spTree>
+    <p:extLst>
+      <p:ext uri="{BB962C8B-B14F-4D97-AF65-F5344CB8AC3E}">
+        <p14:creationId xmlns:p14="http://schemas.microsoft.com/office/powerpoint/2010/main" val="1597511932"/>
+      </p:ext>
+    </p:extLst>
+  </p:cSld>
+  <p:clrMapOvr>
+    <a:masterClrMapping/>
+  </p:clrMapOvr>
+  <p:timing>
+    <p:tnLst>
+      <p:par>
+        <p:cTn id="1" dur="indefinite" restart="never" nodeType="tmRoot"/>
+      </p:par>
+    </p:tnLst>
+  </p:timing>
+</p:sld>
+</file>
+
+<file path=ppt/slides/slide29.xml><?xml version="1.0" encoding="utf-8"?>
 <p:sld xmlns:a="http://schemas.openxmlformats.org/drawingml/2006/main" xmlns:r="http://schemas.openxmlformats.org/officeDocument/2006/relationships" xmlns:p="http://schemas.openxmlformats.org/presentationml/2006/main">
   <p:cSld>
     <p:spTree>
@@ -9235,7 +10070,143 @@
 </p:sld>
 </file>
 
-<file path=ppt/slides/slide23.xml><?xml version="1.0" encoding="utf-8"?>
+<file path=ppt/slides/slide3.xml><?xml version="1.0" encoding="utf-8"?>
+<p:sld xmlns:a="http://schemas.openxmlformats.org/drawingml/2006/main" xmlns:r="http://schemas.openxmlformats.org/officeDocument/2006/relationships" xmlns:p="http://schemas.openxmlformats.org/presentationml/2006/main">
+  <p:cSld>
+    <p:spTree>
+      <p:nvGrpSpPr>
+        <p:cNvPr id="1" name=""/>
+        <p:cNvGrpSpPr/>
+        <p:nvPr/>
+      </p:nvGrpSpPr>
+      <p:grpSpPr>
+        <a:xfrm>
+          <a:off x="0" y="0"/>
+          <a:ext cx="0" cy="0"/>
+          <a:chOff x="0" y="0"/>
+          <a:chExt cx="0" cy="0"/>
+        </a:xfrm>
+      </p:grpSpPr>
+      <p:sp>
+        <p:nvSpPr>
+          <p:cNvPr id="2" name="Title 1"/>
+          <p:cNvSpPr>
+            <a:spLocks noGrp="1"/>
+          </p:cNvSpPr>
+          <p:nvPr>
+            <p:ph type="title"/>
+          </p:nvPr>
+        </p:nvSpPr>
+        <p:spPr/>
+        <p:txBody>
+          <a:bodyPr/>
+          <a:lstStyle/>
+          <a:p>
+            <a:r>
+              <a:rPr lang="en-US" dirty="0" smtClean="0"/>
+              <a:t>Audiences</a:t>
+            </a:r>
+            <a:endParaRPr lang="en-US" dirty="0"/>
+          </a:p>
+        </p:txBody>
+      </p:sp>
+      <p:sp>
+        <p:nvSpPr>
+          <p:cNvPr id="3" name="Content Placeholder 2"/>
+          <p:cNvSpPr>
+            <a:spLocks noGrp="1"/>
+          </p:cNvSpPr>
+          <p:nvPr>
+            <p:ph idx="1"/>
+          </p:nvPr>
+        </p:nvSpPr>
+        <p:spPr/>
+        <p:txBody>
+          <a:bodyPr/>
+          <a:lstStyle/>
+          <a:p>
+            <a:r>
+              <a:rPr lang="en-US" dirty="0" smtClean="0"/>
+              <a:t>Practitioners</a:t>
+            </a:r>
+          </a:p>
+          <a:p>
+            <a:pPr lvl="1"/>
+            <a:r>
+              <a:rPr lang="en-US" dirty="0" smtClean="0"/>
+              <a:t>Experience with some programming language</a:t>
+            </a:r>
+          </a:p>
+          <a:p>
+            <a:pPr lvl="1"/>
+            <a:r>
+              <a:rPr lang="en-US" dirty="0" smtClean="0"/>
+              <a:t>Work experience</a:t>
+            </a:r>
+          </a:p>
+          <a:p>
+            <a:r>
+              <a:rPr lang="en-US" dirty="0" smtClean="0"/>
+              <a:t>Masters Students in Computer Science</a:t>
+            </a:r>
+          </a:p>
+          <a:p>
+            <a:pPr lvl="1"/>
+            <a:r>
+              <a:rPr lang="en-US" dirty="0" smtClean="0"/>
+              <a:t>May not have an undergrad CS degree</a:t>
+            </a:r>
+          </a:p>
+          <a:p>
+            <a:pPr lvl="1"/>
+            <a:r>
+              <a:rPr lang="en-US" dirty="0" smtClean="0"/>
+              <a:t>Focus is on research skills</a:t>
+            </a:r>
+          </a:p>
+          <a:p>
+            <a:r>
+              <a:rPr lang="en-US" dirty="0" smtClean="0"/>
+              <a:t>Undergraduates in Computer Science</a:t>
+            </a:r>
+          </a:p>
+          <a:p>
+            <a:pPr lvl="1"/>
+            <a:r>
+              <a:rPr lang="en-US" dirty="0" smtClean="0"/>
+              <a:t>Highest variability in background</a:t>
+            </a:r>
+          </a:p>
+          <a:p>
+            <a:pPr lvl="1"/>
+            <a:r>
+              <a:rPr lang="en-US" dirty="0" smtClean="0"/>
+              <a:t>May not know C</a:t>
+            </a:r>
+          </a:p>
+        </p:txBody>
+      </p:sp>
+    </p:spTree>
+    <p:extLst>
+      <p:ext uri="{BB962C8B-B14F-4D97-AF65-F5344CB8AC3E}">
+        <p14:creationId xmlns:p14="http://schemas.microsoft.com/office/powerpoint/2010/main" val="1710415718"/>
+      </p:ext>
+    </p:extLst>
+  </p:cSld>
+  <p:clrMapOvr>
+    <a:masterClrMapping/>
+  </p:clrMapOvr>
+  <p:timing>
+    <p:tnLst>
+      <p:par>
+        <p:cTn id="1" dur="indefinite" restart="never" nodeType="tmRoot"/>
+      </p:par>
+    </p:tnLst>
+  </p:timing>
+</p:sld>
+</file>
+
+<file path=ppt/slides/slide30.xml><?xml version="1.0" encoding="utf-8"?>
 <p:sld xmlns:a="http://schemas.openxmlformats.org/drawingml/2006/main" xmlns:r="http://schemas.openxmlformats.org/officeDocument/2006/relationships" xmlns:p="http://schemas.openxmlformats.org/presentationml/2006/main">
   <p:cSld>
     <p:spTree>
@@ -9446,7 +10417,7 @@
 </p:sld>
 </file>
 
-<file path=ppt/slides/slide24.xml><?xml version="1.0" encoding="utf-8"?>
+<file path=ppt/slides/slide31.xml><?xml version="1.0" encoding="utf-8"?>
 <p:sld xmlns:a="http://schemas.openxmlformats.org/drawingml/2006/main" xmlns:r="http://schemas.openxmlformats.org/officeDocument/2006/relationships" xmlns:p="http://schemas.openxmlformats.org/presentationml/2006/main">
   <p:cSld>
     <p:spTree>
@@ -9550,7 +10521,10 @@
             <a:endParaRPr lang="en-US" dirty="0"/>
           </a:p>
           <a:p>
-            <a:endParaRPr lang="en-US" dirty="0" smtClean="0"/>
+            <a:endParaRPr lang="en-US" dirty="0"/>
+          </a:p>
+          <a:p>
+            <a:endParaRPr lang="en-US" dirty="0"/>
           </a:p>
           <a:p>
             <a:r>
@@ -9613,7 +10587,7 @@
 </p:sld>
 </file>
 
-<file path=ppt/slides/slide25.xml><?xml version="1.0" encoding="utf-8"?>
+<file path=ppt/slides/slide32.xml><?xml version="1.0" encoding="utf-8"?>
 <p:sld xmlns:a="http://schemas.openxmlformats.org/drawingml/2006/main" xmlns:r="http://schemas.openxmlformats.org/officeDocument/2006/relationships" xmlns:p="http://schemas.openxmlformats.org/presentationml/2006/main">
   <p:cSld>
     <p:spTree>
@@ -9770,7 +10744,7 @@
 </p:sld>
 </file>
 
-<file path=ppt/slides/slide3.xml><?xml version="1.0" encoding="utf-8"?>
+<file path=ppt/slides/slide4.xml><?xml version="1.0" encoding="utf-8"?>
 <p:sld xmlns:a="http://schemas.openxmlformats.org/drawingml/2006/main" xmlns:r="http://schemas.openxmlformats.org/officeDocument/2006/relationships" xmlns:p="http://schemas.openxmlformats.org/presentationml/2006/main">
   <p:cSld>
     <p:spTree>
@@ -9820,61 +10794,90 @@
             <p:ph idx="1"/>
           </p:nvPr>
         </p:nvSpPr>
-        <p:spPr/>
+        <p:spPr>
+          <a:xfrm>
+            <a:off x="838200" y="1426866"/>
+            <a:ext cx="10515600" cy="5174901"/>
+          </a:xfrm>
+        </p:spPr>
         <p:txBody>
           <a:bodyPr>
-            <a:normAutofit fontScale="85000" lnSpcReduction="20000"/>
+            <a:normAutofit fontScale="92500" lnSpcReduction="10000"/>
           </a:bodyPr>
           <a:lstStyle/>
           <a:p>
             <a:r>
-              <a:rPr lang="en-US" smtClean="0"/>
+              <a:rPr lang="en-US" dirty="0" smtClean="0"/>
               <a:t>Trial by fire (undergraduate): in micro, recreate classical elements and forms of OS design: kernels, processes, filesystems</a:t>
             </a:r>
           </a:p>
           <a:p>
             <a:r>
-              <a:rPr lang="en-US" smtClean="0"/>
+              <a:rPr lang="en-US" dirty="0" smtClean="0"/>
               <a:t>Trivial Tinkering (undergraduate): study the basics of the OS and replace a small driver or modify only in the small</a:t>
             </a:r>
           </a:p>
           <a:p>
             <a:r>
-              <a:rPr lang="en-US" smtClean="0"/>
+              <a:rPr lang="en-US" dirty="0" smtClean="0"/>
               <a:t>Research readings course (graduate): read, present, discuss, and write about classic research; term project/exams</a:t>
             </a:r>
           </a:p>
           <a:p>
             <a:r>
-              <a:rPr lang="en-US" smtClean="0"/>
-              <a:t>Deep-dive experimentation course (graduate): learn about and analyse specific CPU/OS/protocol behaviours using tracing</a:t>
+              <a:rPr lang="en-US" dirty="0" smtClean="0"/>
+              <a:t>Deep-dive experimentation course (graduate): learn about and </a:t>
+            </a:r>
+            <a:r>
+              <a:rPr lang="en-US" dirty="0" err="1" smtClean="0"/>
+              <a:t>analyse</a:t>
+            </a:r>
+            <a:r>
+              <a:rPr lang="en-US" dirty="0" smtClean="0"/>
+              <a:t> specific CPU/OS/protocol </a:t>
+            </a:r>
+            <a:r>
+              <a:rPr lang="en-US" dirty="0" err="1" smtClean="0"/>
+              <a:t>behaviours</a:t>
+            </a:r>
+            <a:r>
+              <a:rPr lang="en-US" dirty="0" smtClean="0"/>
+              <a:t> using tracing</a:t>
             </a:r>
           </a:p>
           <a:p>
             <a:pPr lvl="1"/>
             <a:r>
-              <a:rPr lang="en-US" smtClean="0"/>
+              <a:rPr lang="en-US" dirty="0" smtClean="0"/>
               <a:t>mitigates the risk of OS kernel hacking in a short course;</a:t>
             </a:r>
           </a:p>
           <a:p>
             <a:pPr lvl="1"/>
             <a:r>
-              <a:rPr lang="en-US" smtClean="0"/>
+              <a:rPr lang="en-US" dirty="0" smtClean="0"/>
               <a:t>works on real-world systems rather than toys; and</a:t>
             </a:r>
           </a:p>
           <a:p>
             <a:pPr lvl="1"/>
             <a:r>
-              <a:rPr lang="en-US" smtClean="0"/>
+              <a:rPr lang="en-US" dirty="0" smtClean="0"/>
               <a:t>targets research skills, not just OS design</a:t>
             </a:r>
           </a:p>
           <a:p>
             <a:r>
-              <a:rPr lang="en-US" smtClean="0"/>
-              <a:t>Only recently possible due to development of integrated tracing and profiling tools; e.g., DTrace, CPU performance counters, etc.</a:t>
+              <a:rPr lang="en-US" dirty="0" smtClean="0"/>
+              <a:t>Only recently possible due to development of integrated tracing and profiling tools; e.g., </a:t>
+            </a:r>
+            <a:r>
+              <a:rPr lang="en-US" dirty="0" err="1" smtClean="0"/>
+              <a:t>DTrace</a:t>
+            </a:r>
+            <a:r>
+              <a:rPr lang="en-US" dirty="0" smtClean="0"/>
+              <a:t>, CPU performance counters, etc.</a:t>
             </a:r>
             <a:endParaRPr lang="en-US" dirty="0"/>
           </a:p>
@@ -10264,117 +11267,6 @@
 </p:sld>
 </file>
 
-<file path=ppt/slides/slide4.xml><?xml version="1.0" encoding="utf-8"?>
-<p:sld xmlns:a="http://schemas.openxmlformats.org/drawingml/2006/main" xmlns:r="http://schemas.openxmlformats.org/officeDocument/2006/relationships" xmlns:p="http://schemas.openxmlformats.org/presentationml/2006/main">
-  <p:cSld>
-    <p:spTree>
-      <p:nvGrpSpPr>
-        <p:cNvPr id="1" name=""/>
-        <p:cNvGrpSpPr/>
-        <p:nvPr/>
-      </p:nvGrpSpPr>
-      <p:grpSpPr>
-        <a:xfrm>
-          <a:off x="0" y="0"/>
-          <a:ext cx="0" cy="0"/>
-          <a:chOff x="0" y="0"/>
-          <a:chExt cx="0" cy="0"/>
-        </a:xfrm>
-      </p:grpSpPr>
-      <p:sp>
-        <p:nvSpPr>
-          <p:cNvPr id="2" name="Title 1"/>
-          <p:cNvSpPr>
-            <a:spLocks noGrp="1"/>
-          </p:cNvSpPr>
-          <p:nvPr>
-            <p:ph type="title"/>
-          </p:nvPr>
-        </p:nvSpPr>
-        <p:spPr/>
-        <p:txBody>
-          <a:bodyPr/>
-          <a:lstStyle/>
-          <a:p>
-            <a:r>
-              <a:rPr lang="en-US" smtClean="0"/>
-              <a:t>Aims of the course</a:t>
-            </a:r>
-            <a:endParaRPr lang="en-US" dirty="0"/>
-          </a:p>
-        </p:txBody>
-      </p:sp>
-      <p:sp>
-        <p:nvSpPr>
-          <p:cNvPr id="3" name="Content Placeholder 2"/>
-          <p:cNvSpPr>
-            <a:spLocks noGrp="1"/>
-          </p:cNvSpPr>
-          <p:nvPr>
-            <p:ph idx="1"/>
-          </p:nvPr>
-        </p:nvSpPr>
-        <p:spPr/>
-        <p:txBody>
-          <a:bodyPr/>
-          <a:lstStyle/>
-          <a:p>
-            <a:r>
-              <a:rPr lang="en-US" smtClean="0"/>
-              <a:t>Teach methodology, skills, and knowledge required to understand and perform research on contemporary operating systems by...</a:t>
-            </a:r>
-          </a:p>
-          <a:p>
-            <a:pPr lvl="1"/>
-            <a:r>
-              <a:rPr lang="en-US" smtClean="0"/>
-              <a:t>Teaching systems-analysis methodology and practice</a:t>
-            </a:r>
-          </a:p>
-          <a:p>
-            <a:pPr lvl="1"/>
-            <a:r>
-              <a:rPr lang="en-US" smtClean="0"/>
-              <a:t>Exploring real-world systems artifacts</a:t>
-            </a:r>
-          </a:p>
-          <a:p>
-            <a:pPr lvl="1"/>
-            <a:r>
-              <a:rPr lang="en-US" smtClean="0"/>
-              <a:t>Developing scientific writing skills</a:t>
-            </a:r>
-          </a:p>
-          <a:p>
-            <a:pPr lvl="1"/>
-            <a:r>
-              <a:rPr lang="en-US" smtClean="0"/>
-              <a:t>Reading selected original systems research papers</a:t>
-            </a:r>
-            <a:endParaRPr lang="en-US" dirty="0"/>
-          </a:p>
-        </p:txBody>
-      </p:sp>
-    </p:spTree>
-    <p:extLst>
-      <p:ext uri="{BB962C8B-B14F-4D97-AF65-F5344CB8AC3E}">
-        <p14:creationId xmlns:p14="http://schemas.microsoft.com/office/powerpoint/2010/main" val="627780707"/>
-      </p:ext>
-    </p:extLst>
-  </p:cSld>
-  <p:clrMapOvr>
-    <a:masterClrMapping/>
-  </p:clrMapOvr>
-  <p:timing>
-    <p:tnLst>
-      <p:par>
-        <p:cTn id="1" dur="indefinite" restart="never" nodeType="tmRoot"/>
-      </p:par>
-    </p:tnLst>
-  </p:timing>
-</p:sld>
-</file>
-
 <file path=ppt/slides/slide5.xml><?xml version="1.0" encoding="utf-8"?>
 <p:sld xmlns:a="http://schemas.openxmlformats.org/drawingml/2006/main" xmlns:r="http://schemas.openxmlformats.org/officeDocument/2006/relationships" xmlns:p="http://schemas.openxmlformats.org/presentationml/2006/main">
   <p:cSld>
@@ -10516,11 +11408,7 @@
           <a:p>
             <a:r>
               <a:rPr lang="en-US" dirty="0" smtClean="0"/>
-              <a:t>Masters Course </a:t>
-            </a:r>
-            <a:r>
-              <a:rPr lang="en-US" dirty="0" smtClean="0"/>
-              <a:t>Structure</a:t>
+              <a:t>Core Texts</a:t>
             </a:r>
             <a:endParaRPr lang="en-US" dirty="0"/>
           </a:p>
@@ -10538,110 +11426,62 @@
         </p:nvSpPr>
         <p:spPr/>
         <p:txBody>
-          <a:bodyPr numCol="2">
+          <a:bodyPr>
             <a:normAutofit lnSpcReduction="10000"/>
           </a:bodyPr>
           <a:lstStyle/>
           <a:p>
             <a:r>
-              <a:rPr lang="en-US" dirty="0" smtClean="0"/>
-              <a:t>6× One-hour lectures</a:t>
-            </a:r>
-          </a:p>
-          <a:p>
-            <a:pPr lvl="1"/>
-            <a:r>
-              <a:rPr lang="en-US" dirty="0" smtClean="0"/>
-              <a:t>Theory, methodology, architecture, and practice</a:t>
-            </a:r>
-          </a:p>
-          <a:p>
-            <a:r>
-              <a:rPr lang="en-US" dirty="0" smtClean="0"/>
-              <a:t>5× Two-hour labs</a:t>
-            </a:r>
-          </a:p>
-          <a:p>
-            <a:pPr lvl="1"/>
-            <a:r>
-              <a:rPr lang="en-US" dirty="0" smtClean="0"/>
-              <a:t>30-minute </a:t>
+              <a:rPr lang="en-US" dirty="0" smtClean="0">
+                <a:solidFill>
+                  <a:schemeClr val="accent6"/>
+                </a:solidFill>
+              </a:rPr>
+              <a:t>Operating systems: Marshall Kirk </a:t>
+            </a:r>
+            <a:r>
+              <a:rPr lang="en-US" dirty="0" err="1" smtClean="0">
+                <a:solidFill>
+                  <a:schemeClr val="accent6"/>
+                </a:solidFill>
+              </a:rPr>
+              <a:t>McKusick</a:t>
+            </a:r>
+            <a:r>
+              <a:rPr lang="en-US" dirty="0" smtClean="0">
+                <a:solidFill>
+                  <a:schemeClr val="accent6"/>
+                </a:solidFill>
+              </a:rPr>
+              <a:t>, George V. Neville-Neil, and Robert N. M. Watson, The Design and Implementation of the FreeBSD Operating System, 2nd Edition, Pearson Education, Boston, MA, USA, September 2014.</a:t>
+            </a:r>
+          </a:p>
+          <a:p>
+            <a:r>
+              <a:rPr lang="en-US" dirty="0" smtClean="0"/>
+              <a:t>Performance measurement: Raj Jain, The Art of Computer Systems Performance Analysis: Techniques for Experimental Design, Measurement, Simulation, and Modeling, Wiley - </a:t>
             </a:r>
             <a:r>
               <a:rPr lang="en-US" dirty="0" err="1" smtClean="0"/>
-              <a:t>lecturelets</a:t>
-            </a:r>
-            <a:r>
-              <a:rPr lang="en-US" dirty="0" smtClean="0"/>
-              <a:t> on artifacts, tools, and practical skills</a:t>
-            </a:r>
-          </a:p>
-          <a:p>
-            <a:pPr lvl="1"/>
-            <a:r>
-              <a:rPr lang="en-US" dirty="0" smtClean="0"/>
-              <a:t>Remainder on hands-on measurement and experimentation</a:t>
-            </a:r>
-          </a:p>
-          <a:p>
-            <a:pPr lvl="1"/>
-            <a:r>
-              <a:rPr lang="en-US" dirty="0" smtClean="0"/>
-              <a:t>Exploratory questions vs. experimental goals</a:t>
-            </a:r>
-          </a:p>
-          <a:p>
-            <a:r>
-              <a:rPr lang="en-US" dirty="0" smtClean="0"/>
-              <a:t>Assigned readings</a:t>
-            </a:r>
-          </a:p>
-          <a:p>
-            <a:pPr lvl="1"/>
-            <a:r>
-              <a:rPr lang="en-US" dirty="0" smtClean="0"/>
-              <a:t>Selected portions of module texts</a:t>
-            </a:r>
-          </a:p>
-          <a:p>
-            <a:pPr lvl="1"/>
-            <a:r>
-              <a:rPr lang="en-US" dirty="0" smtClean="0"/>
-              <a:t>Historic and contemporary research papers</a:t>
-            </a:r>
-          </a:p>
-          <a:p>
-            <a:r>
-              <a:rPr lang="en-US" dirty="0" smtClean="0"/>
-              <a:t>Assessed lab reports</a:t>
-            </a:r>
-          </a:p>
-          <a:p>
-            <a:pPr lvl="1"/>
-            <a:r>
-              <a:rPr lang="en-US" dirty="0" smtClean="0"/>
-              <a:t>Based on experiments done in (and out) of labs</a:t>
-            </a:r>
-          </a:p>
-          <a:p>
-            <a:pPr lvl="1"/>
-            <a:r>
-              <a:rPr lang="en-US" dirty="0" smtClean="0"/>
-              <a:t>Refine scientific writing style suitable for systems research</a:t>
-            </a:r>
-          </a:p>
-          <a:p>
-            <a:pPr lvl="1"/>
-            <a:r>
-              <a:rPr lang="en-US" dirty="0" smtClean="0"/>
-              <a:t>One ‘practice run’ marked but not assessed</a:t>
-            </a:r>
-          </a:p>
-          <a:p>
-            <a:pPr lvl="1"/>
-            <a:r>
-              <a:rPr lang="en-US" dirty="0" smtClean="0"/>
-              <a:t>Two assessed; 50% of final mark each</a:t>
+              <a:t>Interscience</a:t>
+            </a:r>
+            <a:r>
+              <a:rPr lang="en-US" dirty="0" smtClean="0"/>
+              <a:t>, New York, NY, USA, April 1991.</a:t>
+            </a:r>
+          </a:p>
+          <a:p>
+            <a:r>
+              <a:rPr lang="en-US" dirty="0" smtClean="0"/>
+              <a:t>Tracing and profiling: Brendan Gregg and Jim Mauro, </a:t>
+            </a:r>
+            <a:r>
+              <a:rPr lang="en-US" dirty="0" err="1" smtClean="0"/>
+              <a:t>DTrace</a:t>
+            </a:r>
+            <a:r>
+              <a:rPr lang="en-US" dirty="0" smtClean="0"/>
+              <a:t>: Dynamic Tracing in Oracle Solaris, Mac OS X and FreeBSD, Prentice Hall Press, Upper Saddle River, NJ, USA, April 2011.</a:t>
             </a:r>
             <a:endParaRPr lang="en-US" dirty="0"/>
           </a:p>
@@ -10650,7 +11490,7 @@
     </p:spTree>
     <p:extLst>
       <p:ext uri="{BB962C8B-B14F-4D97-AF65-F5344CB8AC3E}">
-        <p14:creationId xmlns:p14="http://schemas.microsoft.com/office/powerpoint/2010/main" val="1369521448"/>
+        <p14:creationId xmlns:p14="http://schemas.microsoft.com/office/powerpoint/2010/main" val="817247990"/>
       </p:ext>
     </p:extLst>
   </p:cSld>
@@ -10700,8 +11540,16 @@
           <a:lstStyle/>
           <a:p>
             <a:r>
-              <a:rPr lang="en-US" smtClean="0"/>
-              <a:t>Core Texts</a:t>
+              <a:rPr lang="en-US" dirty="0" smtClean="0"/>
+              <a:t>Aims of </a:t>
+            </a:r>
+            <a:r>
+              <a:rPr lang="en-US" dirty="0" smtClean="0"/>
+              <a:t>the Masters </a:t>
+            </a:r>
+            <a:r>
+              <a:rPr lang="en-US" dirty="0" smtClean="0"/>
+              <a:t>course</a:t>
             </a:r>
             <a:endParaRPr lang="en-US" dirty="0"/>
           </a:p>
@@ -10719,26 +11567,40 @@
         </p:nvSpPr>
         <p:spPr/>
         <p:txBody>
-          <a:bodyPr>
-            <a:normAutofit lnSpcReduction="10000"/>
-          </a:bodyPr>
-          <a:lstStyle/>
-          <a:p>
-            <a:r>
-              <a:rPr lang="en-US" smtClean="0"/>
-              <a:t>Operating systems: Marshall Kirk McKusick, George V. Neville-Neil, and Robert N. M. Watson, The Design and Implementation of the FreeBSD Operating System, 2nd Edition, Pearson Education, Boston, MA, USA, September 2014.</a:t>
-            </a:r>
-          </a:p>
-          <a:p>
-            <a:r>
-              <a:rPr lang="en-US" smtClean="0"/>
-              <a:t>Performance measurement: Raj Jain, The Art of Computer Systems Performance Analysis: Techniques for Experimental Design, Measurement, Simulation, and Modeling, Wiley - Interscience, New York, NY, USA, April 1991.</a:t>
-            </a:r>
-          </a:p>
-          <a:p>
-            <a:r>
-              <a:rPr lang="en-US" smtClean="0"/>
-              <a:t>Tracing and profiling: Brendan Gregg and Jim Mauro, DTrace: Dynamic Tracing in Oracle Solaris, Mac OS X and FreeBSD, Prentice Hall Press, Upper Saddle River, NJ, USA, April 2011.</a:t>
+          <a:bodyPr/>
+          <a:lstStyle/>
+          <a:p>
+            <a:r>
+              <a:rPr lang="en-US" smtClean="0"/>
+              <a:t>Teach methodology, skills, and knowledge required to understand and perform research on contemporary operating systems by...</a:t>
+            </a:r>
+          </a:p>
+          <a:p>
+            <a:pPr lvl="1"/>
+            <a:r>
+              <a:rPr lang="en-US" smtClean="0"/>
+              <a:t>Teaching systems-analysis methodology and practice</a:t>
+            </a:r>
+          </a:p>
+          <a:p>
+            <a:pPr lvl="1"/>
+            <a:r>
+              <a:rPr lang="en-US" smtClean="0"/>
+              <a:t>Exploring real-world systems artifacts</a:t>
+            </a:r>
+          </a:p>
+          <a:p>
+            <a:pPr lvl="1"/>
+            <a:r>
+              <a:rPr lang="en-US" smtClean="0"/>
+              <a:t>Developing scientific writing skills</a:t>
+            </a:r>
+          </a:p>
+          <a:p>
+            <a:pPr lvl="1"/>
+            <a:r>
+              <a:rPr lang="en-US" smtClean="0"/>
+              <a:t>Reading selected original systems research papers</a:t>
             </a:r>
             <a:endParaRPr lang="en-US" dirty="0"/>
           </a:p>
@@ -10747,7 +11609,7 @@
     </p:spTree>
     <p:extLst>
       <p:ext uri="{BB962C8B-B14F-4D97-AF65-F5344CB8AC3E}">
-        <p14:creationId xmlns:p14="http://schemas.microsoft.com/office/powerpoint/2010/main" val="817247990"/>
+        <p14:creationId xmlns:p14="http://schemas.microsoft.com/office/powerpoint/2010/main" val="627780707"/>
       </p:ext>
     </p:extLst>
   </p:cSld>
@@ -10797,8 +11659,12 @@
           <a:lstStyle/>
           <a:p>
             <a:r>
-              <a:rPr lang="en-US" smtClean="0"/>
-              <a:t>The lab platform</a:t>
+              <a:rPr lang="en-US" dirty="0" smtClean="0"/>
+              <a:t>Masters Course </a:t>
+            </a:r>
+            <a:r>
+              <a:rPr lang="en-US" dirty="0" smtClean="0"/>
+              <a:t>Structure</a:t>
             </a:r>
             <a:endParaRPr lang="en-US" dirty="0"/>
           </a:p>
@@ -10811,112 +11677,124 @@
             <a:spLocks noGrp="1"/>
           </p:cNvSpPr>
           <p:nvPr>
-            <p:ph sz="half" idx="1"/>
+            <p:ph idx="1"/>
           </p:nvPr>
         </p:nvSpPr>
         <p:spPr/>
         <p:txBody>
-          <a:bodyPr>
+          <a:bodyPr numCol="2">
             <a:normAutofit lnSpcReduction="10000"/>
           </a:bodyPr>
           <a:lstStyle/>
           <a:p>
             <a:r>
-              <a:rPr lang="en-US" smtClean="0"/>
-              <a:t>Beagle Bone Black</a:t>
+              <a:rPr lang="en-US" dirty="0" smtClean="0"/>
+              <a:t>6× One-hour lectures</a:t>
             </a:r>
           </a:p>
           <a:p>
             <a:pPr lvl="1"/>
             <a:r>
-              <a:rPr lang="en-US" smtClean="0"/>
-              <a:t>1GHz 32-bit ARM Cortex A-8</a:t>
+              <a:rPr lang="en-US" dirty="0" smtClean="0"/>
+              <a:t>Theory, methodology, architecture, and practice</a:t>
+            </a:r>
+          </a:p>
+          <a:p>
+            <a:r>
+              <a:rPr lang="en-US" dirty="0" smtClean="0"/>
+              <a:t>5× Two-hour labs</a:t>
             </a:r>
           </a:p>
           <a:p>
             <a:pPr lvl="1"/>
             <a:r>
-              <a:rPr lang="en-US" smtClean="0"/>
-              <a:t>Superscalar, MMU, L1/L2 caches</a:t>
+              <a:rPr lang="en-US" dirty="0" smtClean="0"/>
+              <a:t>30-minute </a:t>
+            </a:r>
+            <a:r>
+              <a:rPr lang="en-US" dirty="0" err="1" smtClean="0"/>
+              <a:t>lecturelets</a:t>
+            </a:r>
+            <a:r>
+              <a:rPr lang="en-US" dirty="0" smtClean="0"/>
+              <a:t> on artifacts, tools, and practical skills</a:t>
             </a:r>
           </a:p>
           <a:p>
             <a:pPr lvl="1"/>
             <a:r>
-              <a:rPr lang="en-US" smtClean="0"/>
-              <a:t>Serial,network USB target from lab workstations</a:t>
-            </a:r>
-          </a:p>
-          <a:p>
-            <a:r>
-              <a:rPr lang="en-US" smtClean="0"/>
-              <a:t>SDcard software images</a:t>
+              <a:rPr lang="en-US" dirty="0" smtClean="0"/>
+              <a:t>Remainder on hands-on measurement and experimentation</a:t>
             </a:r>
           </a:p>
           <a:p>
             <a:pPr lvl="1"/>
             <a:r>
-              <a:rPr lang="en-US" smtClean="0"/>
-              <a:t>FreeBSD operating system</a:t>
+              <a:rPr lang="en-US" dirty="0" smtClean="0"/>
+              <a:t>Exploratory questions vs. experimental goals</a:t>
+            </a:r>
+          </a:p>
+          <a:p>
+            <a:r>
+              <a:rPr lang="en-US" dirty="0" smtClean="0"/>
+              <a:t>Assigned readings</a:t>
             </a:r>
           </a:p>
           <a:p>
             <a:pPr lvl="1"/>
             <a:r>
-              <a:rPr lang="en-US" smtClean="0"/>
-              <a:t>DTrace, CPU performance counters</a:t>
+              <a:rPr lang="en-US" dirty="0" smtClean="0"/>
+              <a:t>Selected portions of module texts</a:t>
             </a:r>
           </a:p>
           <a:p>
             <a:pPr lvl="1"/>
             <a:r>
-              <a:rPr lang="en-US" smtClean="0"/>
-              <a:t>Custom microbenchmarks</a:t>
+              <a:rPr lang="en-US" dirty="0" smtClean="0"/>
+              <a:t>Historic and contemporary research papers</a:t>
+            </a:r>
+          </a:p>
+          <a:p>
+            <a:r>
+              <a:rPr lang="en-US" dirty="0" smtClean="0"/>
+              <a:t>Assessed lab reports</a:t>
             </a:r>
           </a:p>
           <a:p>
             <a:pPr lvl="1"/>
             <a:r>
-              <a:rPr lang="en-US" smtClean="0"/>
-              <a:t>POSIX I/O, POSIX IPC, TCP</a:t>
+              <a:rPr lang="en-US" dirty="0" smtClean="0"/>
+              <a:t>Based on experiments done in (and out) of labs</a:t>
+            </a:r>
+          </a:p>
+          <a:p>
+            <a:pPr lvl="1"/>
+            <a:r>
+              <a:rPr lang="en-US" dirty="0" smtClean="0"/>
+              <a:t>Refine scientific writing style suitable for systems research</a:t>
+            </a:r>
+          </a:p>
+          <a:p>
+            <a:pPr lvl="1"/>
+            <a:r>
+              <a:rPr lang="en-US" dirty="0" smtClean="0"/>
+              <a:t>One ‘practice run’ marked but not assessed</a:t>
+            </a:r>
+          </a:p>
+          <a:p>
+            <a:pPr lvl="1"/>
+            <a:r>
+              <a:rPr lang="en-US" dirty="0" smtClean="0"/>
+              <a:t>Two assessed; 50% of final mark each</a:t>
             </a:r>
             <a:endParaRPr lang="en-US" dirty="0"/>
           </a:p>
         </p:txBody>
       </p:sp>
-      <p:pic>
-        <p:nvPicPr>
-          <p:cNvPr id="9" name="Content Placeholder 8"/>
-          <p:cNvPicPr>
-            <a:picLocks noGrp="1" noChangeAspect="1"/>
-          </p:cNvPicPr>
-          <p:nvPr>
-            <p:ph sz="half" idx="2"/>
-          </p:nvPr>
-        </p:nvPicPr>
-        <p:blipFill>
-          <a:blip r:embed="rId2" cstate="print">
-            <a:extLst>
-              <a:ext uri="{28A0092B-C50C-407E-A947-70E740481C1C}">
-                <a14:useLocalDpi xmlns:a14="http://schemas.microsoft.com/office/drawing/2010/main"/>
-              </a:ext>
-            </a:extLst>
-          </a:blip>
-          <a:stretch>
-            <a:fillRect/>
-          </a:stretch>
-        </p:blipFill>
-        <p:spPr>
-          <a:xfrm>
-            <a:off x="6950671" y="2141538"/>
-            <a:ext cx="2737246" cy="3649662"/>
-          </a:xfrm>
-        </p:spPr>
-      </p:pic>
     </p:spTree>
     <p:extLst>
       <p:ext uri="{BB962C8B-B14F-4D97-AF65-F5344CB8AC3E}">
-        <p14:creationId xmlns:p14="http://schemas.microsoft.com/office/powerpoint/2010/main" val="181561718"/>
+        <p14:creationId xmlns:p14="http://schemas.microsoft.com/office/powerpoint/2010/main" val="1369521448"/>
       </p:ext>
     </p:extLst>
   </p:cSld>
@@ -10967,7 +11845,87 @@
           <a:p>
             <a:r>
               <a:rPr lang="en-US" smtClean="0"/>
-              <a:t>Weeks 1–2: Introduction to kernels and tracing</a:t>
+              <a:t>The lab platform</a:t>
+            </a:r>
+            <a:endParaRPr lang="en-US" dirty="0"/>
+          </a:p>
+        </p:txBody>
+      </p:sp>
+      <p:sp>
+        <p:nvSpPr>
+          <p:cNvPr id="3" name="Content Placeholder 2"/>
+          <p:cNvSpPr>
+            <a:spLocks noGrp="1"/>
+          </p:cNvSpPr>
+          <p:nvPr>
+            <p:ph sz="half" idx="1"/>
+          </p:nvPr>
+        </p:nvSpPr>
+        <p:spPr/>
+        <p:txBody>
+          <a:bodyPr>
+            <a:normAutofit lnSpcReduction="10000"/>
+          </a:bodyPr>
+          <a:lstStyle/>
+          <a:p>
+            <a:r>
+              <a:rPr lang="en-US" smtClean="0"/>
+              <a:t>Beagle Bone Black</a:t>
+            </a:r>
+          </a:p>
+          <a:p>
+            <a:pPr lvl="1"/>
+            <a:r>
+              <a:rPr lang="en-US" smtClean="0"/>
+              <a:t>1GHz 32-bit ARM Cortex A-8</a:t>
+            </a:r>
+          </a:p>
+          <a:p>
+            <a:pPr lvl="1"/>
+            <a:r>
+              <a:rPr lang="en-US" smtClean="0"/>
+              <a:t>Superscalar, MMU, L1/L2 caches</a:t>
+            </a:r>
+          </a:p>
+          <a:p>
+            <a:pPr lvl="1"/>
+            <a:r>
+              <a:rPr lang="en-US" smtClean="0"/>
+              <a:t>Serial,network USB target from lab workstations</a:t>
+            </a:r>
+          </a:p>
+          <a:p>
+            <a:r>
+              <a:rPr lang="en-US" smtClean="0"/>
+              <a:t>SDcard software images</a:t>
+            </a:r>
+          </a:p>
+          <a:p>
+            <a:pPr lvl="1"/>
+            <a:r>
+              <a:rPr lang="en-US" smtClean="0"/>
+              <a:t>FreeBSD operating system</a:t>
+            </a:r>
+          </a:p>
+          <a:p>
+            <a:pPr lvl="1"/>
+            <a:r>
+              <a:rPr lang="en-US" smtClean="0"/>
+              <a:t>DTrace, CPU performance counters</a:t>
+            </a:r>
+          </a:p>
+          <a:p>
+            <a:pPr lvl="1"/>
+            <a:r>
+              <a:rPr lang="en-US" smtClean="0"/>
+              <a:t>Custom microbenchmarks</a:t>
+            </a:r>
+          </a:p>
+          <a:p>
+            <a:pPr lvl="1"/>
+            <a:r>
+              <a:rPr lang="en-US" smtClean="0"/>
+              <a:t>POSIX I/O, POSIX IPC, TCP</a:t>
             </a:r>
             <a:endParaRPr lang="en-US" dirty="0"/>
           </a:p>
@@ -10980,11 +11938,11 @@
             <a:picLocks noGrp="1" noChangeAspect="1"/>
           </p:cNvPicPr>
           <p:nvPr>
-            <p:ph idx="1"/>
+            <p:ph sz="half" idx="2"/>
           </p:nvPr>
         </p:nvPicPr>
         <p:blipFill>
-          <a:blip r:embed="rId2">
+          <a:blip r:embed="rId2" cstate="print">
             <a:extLst>
               <a:ext uri="{28A0092B-C50C-407E-A947-70E740481C1C}">
                 <a14:useLocalDpi xmlns:a14="http://schemas.microsoft.com/office/drawing/2010/main"/>
@@ -10997,58 +11955,15 @@
         </p:blipFill>
         <p:spPr>
           <a:xfrm>
-            <a:off x="3658842" y="1825625"/>
-            <a:ext cx="4874316" cy="2746375"/>
+            <a:off x="6950671" y="2141538"/>
+            <a:ext cx="2737246" cy="3649662"/>
           </a:xfrm>
         </p:spPr>
       </p:pic>
-      <p:sp>
-        <p:nvSpPr>
-          <p:cNvPr id="5" name="Content Placeholder 4"/>
-          <p:cNvSpPr>
-            <a:spLocks noGrp="1"/>
-          </p:cNvSpPr>
-          <p:nvPr>
-            <p:ph idx="13"/>
-          </p:nvPr>
-        </p:nvSpPr>
-        <p:spPr/>
-        <p:txBody>
-          <a:bodyPr>
-            <a:normAutofit fontScale="85000" lnSpcReduction="20000"/>
-          </a:bodyPr>
-          <a:lstStyle/>
-          <a:p>
-            <a:r>
-              <a:rPr lang="en-US" smtClean="0"/>
-              <a:t>Lecture1: Introduction: OSes ,Systems Research ,andL41   </a:t>
-            </a:r>
-          </a:p>
-          <a:p>
-            <a:r>
-              <a:rPr lang="en-US" smtClean="0"/>
-              <a:t>Lecture2: Kernels and Tracing</a:t>
-            </a:r>
-          </a:p>
-          <a:p>
-            <a:r>
-              <a:rPr lang="en-US" smtClean="0"/>
-              <a:t>Lab1:Getting started with kernel tracing / POSIX I/O</a:t>
-            </a:r>
-          </a:p>
-          <a:p>
-            <a:r>
-              <a:rPr lang="en-US" smtClean="0"/>
-              <a:t>LabReport1: I/O Performance(practice)</a:t>
-            </a:r>
-            <a:endParaRPr lang="en-US" dirty="0"/>
-          </a:p>
-        </p:txBody>
-      </p:sp>
     </p:spTree>
     <p:extLst>
       <p:ext uri="{BB962C8B-B14F-4D97-AF65-F5344CB8AC3E}">
-        <p14:creationId xmlns:p14="http://schemas.microsoft.com/office/powerpoint/2010/main" val="1711959560"/>
+        <p14:creationId xmlns:p14="http://schemas.microsoft.com/office/powerpoint/2010/main" val="181561718"/>
       </p:ext>
     </p:extLst>
   </p:cSld>

</xml_diff>

<commit_message>
Add beastie updated by Anne Dickison at the FreeBSD Foundation Update slides to have the Beastie in the template
</commit_message>
<xml_diff>
--- a/teaching_with_freebsd.pptx
+++ b/teaching_with_freebsd.pptx
@@ -2,7 +2,7 @@
 <file path=ppt/presentation.xml><?xml version="1.0" encoding="utf-8"?>
 <p:presentation xmlns:a="http://schemas.openxmlformats.org/drawingml/2006/main" xmlns:r="http://schemas.openxmlformats.org/officeDocument/2006/relationships" xmlns:p="http://schemas.openxmlformats.org/presentationml/2006/main" saveSubsetFonts="1" autoCompressPictures="0">
   <p:sldMasterIdLst>
-    <p:sldMasterId id="2147483648" r:id="rId1"/>
+    <p:sldMasterId id="2147483662" r:id="rId1"/>
   </p:sldMasterIdLst>
   <p:sldIdLst>
     <p:sldId id="256" r:id="rId2"/>
@@ -135,6 +135,11 @@
       </a:defRPr>
     </a:lvl9pPr>
   </p:defaultTextStyle>
+  <p:extLst>
+    <p:ext uri="{EFAFB233-063F-42B5-8137-9DF3F51BA10A}">
+      <p15:sldGuideLst xmlns:p15="http://schemas.microsoft.com/office/powerpoint/2012/main"/>
+    </p:ext>
+  </p:extLst>
 </p:presentation>
 </file>
 
@@ -320,7 +325,7 @@
     </p:spTree>
     <p:extLst>
       <p:ext uri="{BB962C8B-B14F-4D97-AF65-F5344CB8AC3E}">
-        <p14:creationId xmlns:p14="http://schemas.microsoft.com/office/powerpoint/2010/main" val="418355700"/>
+        <p14:creationId xmlns:p14="http://schemas.microsoft.com/office/powerpoint/2010/main" val="1423626913"/>
       </p:ext>
     </p:extLst>
   </p:cSld>
@@ -490,7 +495,7 @@
     </p:spTree>
     <p:extLst>
       <p:ext uri="{BB962C8B-B14F-4D97-AF65-F5344CB8AC3E}">
-        <p14:creationId xmlns:p14="http://schemas.microsoft.com/office/powerpoint/2010/main" val="974864197"/>
+        <p14:creationId xmlns:p14="http://schemas.microsoft.com/office/powerpoint/2010/main" val="543681384"/>
       </p:ext>
     </p:extLst>
   </p:cSld>
@@ -670,7 +675,7 @@
     </p:spTree>
     <p:extLst>
       <p:ext uri="{BB962C8B-B14F-4D97-AF65-F5344CB8AC3E}">
-        <p14:creationId xmlns:p14="http://schemas.microsoft.com/office/powerpoint/2010/main" val="1389816016"/>
+        <p14:creationId xmlns:p14="http://schemas.microsoft.com/office/powerpoint/2010/main" val="110102903"/>
       </p:ext>
     </p:extLst>
   </p:cSld>
@@ -742,35 +747,35 @@
           <a:p>
             <a:pPr lvl="0"/>
             <a:r>
-              <a:rPr lang="en-US" dirty="0" smtClean="0"/>
+              <a:rPr lang="en-US" smtClean="0"/>
               <a:t>Click to edit Master text styles</a:t>
             </a:r>
           </a:p>
           <a:p>
             <a:pPr lvl="1"/>
             <a:r>
-              <a:rPr lang="en-US" dirty="0" smtClean="0"/>
+              <a:rPr lang="en-US" smtClean="0"/>
               <a:t>Second level</a:t>
             </a:r>
           </a:p>
           <a:p>
             <a:pPr lvl="2"/>
             <a:r>
-              <a:rPr lang="en-US" dirty="0" smtClean="0"/>
+              <a:rPr lang="en-US" smtClean="0"/>
               <a:t>Third level</a:t>
             </a:r>
           </a:p>
           <a:p>
             <a:pPr lvl="3"/>
             <a:r>
-              <a:rPr lang="en-US" dirty="0" smtClean="0"/>
+              <a:rPr lang="en-US" smtClean="0"/>
               <a:t>Fourth level</a:t>
             </a:r>
           </a:p>
           <a:p>
             <a:pPr lvl="4"/>
             <a:r>
-              <a:rPr lang="en-US" dirty="0" smtClean="0"/>
+              <a:rPr lang="en-US" smtClean="0"/>
               <a:t>Fifth level</a:t>
             </a:r>
             <a:endParaRPr lang="en-US" dirty="0"/>
@@ -864,35 +869,35 @@
           <a:p>
             <a:pPr lvl="0"/>
             <a:r>
-              <a:rPr lang="en-US" dirty="0" smtClean="0"/>
+              <a:rPr lang="en-US" smtClean="0"/>
               <a:t>Click to edit Master text styles</a:t>
             </a:r>
           </a:p>
           <a:p>
             <a:pPr lvl="1"/>
             <a:r>
-              <a:rPr lang="en-US" dirty="0" smtClean="0"/>
+              <a:rPr lang="en-US" smtClean="0"/>
               <a:t>Second level</a:t>
             </a:r>
           </a:p>
           <a:p>
             <a:pPr lvl="2"/>
             <a:r>
-              <a:rPr lang="en-US" dirty="0" smtClean="0"/>
+              <a:rPr lang="en-US" smtClean="0"/>
               <a:t>Third level</a:t>
             </a:r>
           </a:p>
           <a:p>
             <a:pPr lvl="3"/>
             <a:r>
-              <a:rPr lang="en-US" dirty="0" smtClean="0"/>
+              <a:rPr lang="en-US" smtClean="0"/>
               <a:t>Fourth level</a:t>
             </a:r>
           </a:p>
           <a:p>
             <a:pPr lvl="4"/>
             <a:r>
-              <a:rPr lang="en-US" dirty="0" smtClean="0"/>
+              <a:rPr lang="en-US" smtClean="0"/>
               <a:t>Fifth level</a:t>
             </a:r>
             <a:endParaRPr lang="en-US" dirty="0"/>
@@ -902,7 +907,7 @@
     </p:spTree>
     <p:extLst>
       <p:ext uri="{BB962C8B-B14F-4D97-AF65-F5344CB8AC3E}">
-        <p14:creationId xmlns:p14="http://schemas.microsoft.com/office/powerpoint/2010/main" val="2081015686"/>
+        <p14:creationId xmlns:p14="http://schemas.microsoft.com/office/powerpoint/2010/main" val="1516070654"/>
       </p:ext>
     </p:extLst>
   </p:cSld>
@@ -1012,35 +1017,35 @@
           <a:p>
             <a:pPr lvl="0"/>
             <a:r>
-              <a:rPr lang="en-US" dirty="0" smtClean="0"/>
+              <a:rPr lang="en-US" smtClean="0"/>
               <a:t>Click to edit Master text styles</a:t>
             </a:r>
           </a:p>
           <a:p>
             <a:pPr lvl="1"/>
             <a:r>
-              <a:rPr lang="en-US" dirty="0" smtClean="0"/>
+              <a:rPr lang="en-US" smtClean="0"/>
               <a:t>Second level</a:t>
             </a:r>
           </a:p>
           <a:p>
             <a:pPr lvl="2"/>
             <a:r>
-              <a:rPr lang="en-US" dirty="0" smtClean="0"/>
+              <a:rPr lang="en-US" smtClean="0"/>
               <a:t>Third level</a:t>
             </a:r>
           </a:p>
           <a:p>
             <a:pPr lvl="3"/>
             <a:r>
-              <a:rPr lang="en-US" dirty="0" smtClean="0"/>
+              <a:rPr lang="en-US" smtClean="0"/>
               <a:t>Fourth level</a:t>
             </a:r>
           </a:p>
           <a:p>
             <a:pPr lvl="4"/>
             <a:r>
-              <a:rPr lang="en-US" dirty="0" smtClean="0"/>
+              <a:rPr lang="en-US" smtClean="0"/>
               <a:t>Fifth level</a:t>
             </a:r>
             <a:endParaRPr lang="en-US" dirty="0"/>
@@ -1115,7 +1120,7 @@
     </p:spTree>
     <p:extLst>
       <p:ext uri="{BB962C8B-B14F-4D97-AF65-F5344CB8AC3E}">
-        <p14:creationId xmlns:p14="http://schemas.microsoft.com/office/powerpoint/2010/main" val="97985408"/>
+        <p14:creationId xmlns:p14="http://schemas.microsoft.com/office/powerpoint/2010/main" val="706010123"/>
       </p:ext>
     </p:extLst>
   </p:cSld>
@@ -1292,7 +1297,7 @@
     </p:spTree>
     <p:extLst>
       <p:ext uri="{BB962C8B-B14F-4D97-AF65-F5344CB8AC3E}">
-        <p14:creationId xmlns:p14="http://schemas.microsoft.com/office/powerpoint/2010/main" val="1576454909"/>
+        <p14:creationId xmlns:p14="http://schemas.microsoft.com/office/powerpoint/2010/main" val="1782215564"/>
       </p:ext>
     </p:extLst>
   </p:cSld>
@@ -1538,7 +1543,7 @@
     </p:spTree>
     <p:extLst>
       <p:ext uri="{BB962C8B-B14F-4D97-AF65-F5344CB8AC3E}">
-        <p14:creationId xmlns:p14="http://schemas.microsoft.com/office/powerpoint/2010/main" val="1971902524"/>
+        <p14:creationId xmlns:p14="http://schemas.microsoft.com/office/powerpoint/2010/main" val="595075792"/>
       </p:ext>
     </p:extLst>
   </p:cSld>
@@ -1770,7 +1775,7 @@
     </p:spTree>
     <p:extLst>
       <p:ext uri="{BB962C8B-B14F-4D97-AF65-F5344CB8AC3E}">
-        <p14:creationId xmlns:p14="http://schemas.microsoft.com/office/powerpoint/2010/main" val="1798080364"/>
+        <p14:creationId xmlns:p14="http://schemas.microsoft.com/office/powerpoint/2010/main" val="607492065"/>
       </p:ext>
     </p:extLst>
   </p:cSld>
@@ -2137,7 +2142,7 @@
     </p:spTree>
     <p:extLst>
       <p:ext uri="{BB962C8B-B14F-4D97-AF65-F5344CB8AC3E}">
-        <p14:creationId xmlns:p14="http://schemas.microsoft.com/office/powerpoint/2010/main" val="946797164"/>
+        <p14:creationId xmlns:p14="http://schemas.microsoft.com/office/powerpoint/2010/main" val="981878617"/>
       </p:ext>
     </p:extLst>
   </p:cSld>
@@ -2255,7 +2260,7 @@
     </p:spTree>
     <p:extLst>
       <p:ext uri="{BB962C8B-B14F-4D97-AF65-F5344CB8AC3E}">
-        <p14:creationId xmlns:p14="http://schemas.microsoft.com/office/powerpoint/2010/main" val="2113594725"/>
+        <p14:creationId xmlns:p14="http://schemas.microsoft.com/office/powerpoint/2010/main" val="1169572371"/>
       </p:ext>
     </p:extLst>
   </p:cSld>
@@ -2350,7 +2355,7 @@
     </p:spTree>
     <p:extLst>
       <p:ext uri="{BB962C8B-B14F-4D97-AF65-F5344CB8AC3E}">
-        <p14:creationId xmlns:p14="http://schemas.microsoft.com/office/powerpoint/2010/main" val="1659538048"/>
+        <p14:creationId xmlns:p14="http://schemas.microsoft.com/office/powerpoint/2010/main" val="1085018406"/>
       </p:ext>
     </p:extLst>
   </p:cSld>
@@ -2627,7 +2632,7 @@
     </p:spTree>
     <p:extLst>
       <p:ext uri="{BB962C8B-B14F-4D97-AF65-F5344CB8AC3E}">
-        <p14:creationId xmlns:p14="http://schemas.microsoft.com/office/powerpoint/2010/main" val="338365500"/>
+        <p14:creationId xmlns:p14="http://schemas.microsoft.com/office/powerpoint/2010/main" val="1620702965"/>
       </p:ext>
     </p:extLst>
   </p:cSld>
@@ -2743,6 +2748,10 @@
             </a:lvl9pPr>
           </a:lstStyle>
           <a:p>
+            <a:r>
+              <a:rPr lang="en-US" smtClean="0"/>
+              <a:t>Drag picture to placeholder or click icon to add</a:t>
+            </a:r>
             <a:endParaRPr lang="en-US"/>
           </a:p>
         </p:txBody>
@@ -2880,7 +2889,7 @@
     </p:spTree>
     <p:extLst>
       <p:ext uri="{BB962C8B-B14F-4D97-AF65-F5344CB8AC3E}">
-        <p14:creationId xmlns:p14="http://schemas.microsoft.com/office/powerpoint/2010/main" val="372261244"/>
+        <p14:creationId xmlns:p14="http://schemas.microsoft.com/office/powerpoint/2010/main" val="472154207"/>
       </p:ext>
     </p:extLst>
   </p:cSld>
@@ -3126,28 +3135,58 @@
           </a:p>
         </p:txBody>
       </p:sp>
+      <p:pic>
+        <p:nvPicPr>
+          <p:cNvPr id="7" name="Picture 6"/>
+          <p:cNvPicPr>
+            <a:picLocks noChangeAspect="1"/>
+          </p:cNvPicPr>
+          <p:nvPr userDrawn="1"/>
+        </p:nvPicPr>
+        <p:blipFill>
+          <a:blip r:embed="rId15">
+            <a:extLst>
+              <a:ext uri="{28A0092B-C50C-407E-A947-70E740481C1C}">
+                <a14:useLocalDpi xmlns:a14="http://schemas.microsoft.com/office/drawing/2010/main" val="0"/>
+              </a:ext>
+            </a:extLst>
+          </a:blip>
+          <a:stretch>
+            <a:fillRect/>
+          </a:stretch>
+        </p:blipFill>
+        <p:spPr>
+          <a:xfrm>
+            <a:off x="10831285" y="5374864"/>
+            <a:ext cx="1235947" cy="1483136"/>
+          </a:xfrm>
+          <a:prstGeom prst="rect">
+            <a:avLst/>
+          </a:prstGeom>
+        </p:spPr>
+      </p:pic>
     </p:spTree>
     <p:extLst>
       <p:ext uri="{BB962C8B-B14F-4D97-AF65-F5344CB8AC3E}">
-        <p14:creationId xmlns:p14="http://schemas.microsoft.com/office/powerpoint/2010/main" val="1299605791"/>
+        <p14:creationId xmlns:p14="http://schemas.microsoft.com/office/powerpoint/2010/main" val="1228751495"/>
       </p:ext>
     </p:extLst>
   </p:cSld>
   <p:clrMap bg1="lt1" tx1="dk1" bg2="lt2" tx2="dk2" accent1="accent1" accent2="accent2" accent3="accent3" accent4="accent4" accent5="accent5" accent6="accent6" hlink="hlink" folHlink="folHlink"/>
   <p:sldLayoutIdLst>
-    <p:sldLayoutId id="2147483649" r:id="rId1"/>
-    <p:sldLayoutId id="2147483650" r:id="rId2"/>
-    <p:sldLayoutId id="2147483651" r:id="rId3"/>
-    <p:sldLayoutId id="2147483652" r:id="rId4"/>
-    <p:sldLayoutId id="2147483653" r:id="rId5"/>
-    <p:sldLayoutId id="2147483654" r:id="rId6"/>
-    <p:sldLayoutId id="2147483655" r:id="rId7"/>
-    <p:sldLayoutId id="2147483656" r:id="rId8"/>
-    <p:sldLayoutId id="2147483657" r:id="rId9"/>
-    <p:sldLayoutId id="2147483658" r:id="rId10"/>
-    <p:sldLayoutId id="2147483659" r:id="rId11"/>
-    <p:sldLayoutId id="2147483660" r:id="rId12"/>
-    <p:sldLayoutId id="2147483661" r:id="rId13"/>
+    <p:sldLayoutId id="2147483663" r:id="rId1"/>
+    <p:sldLayoutId id="2147483664" r:id="rId2"/>
+    <p:sldLayoutId id="2147483665" r:id="rId3"/>
+    <p:sldLayoutId id="2147483666" r:id="rId4"/>
+    <p:sldLayoutId id="2147483667" r:id="rId5"/>
+    <p:sldLayoutId id="2147483668" r:id="rId6"/>
+    <p:sldLayoutId id="2147483669" r:id="rId7"/>
+    <p:sldLayoutId id="2147483670" r:id="rId8"/>
+    <p:sldLayoutId id="2147483671" r:id="rId9"/>
+    <p:sldLayoutId id="2147483672" r:id="rId10"/>
+    <p:sldLayoutId id="2147483673" r:id="rId11"/>
+    <p:sldLayoutId id="2147483674" r:id="rId12"/>
+    <p:sldLayoutId id="2147483675" r:id="rId13"/>
   </p:sldLayoutIdLst>
   <p:txStyles>
     <p:titleStyle>
@@ -3702,49 +3741,6 @@
           </a:p>
         </p:txBody>
       </p:sp>
-      <p:sp>
-        <p:nvSpPr>
-          <p:cNvPr id="5" name="Content Placeholder 4"/>
-          <p:cNvSpPr>
-            <a:spLocks noGrp="1"/>
-          </p:cNvSpPr>
-          <p:nvPr>
-            <p:ph idx="13"/>
-          </p:nvPr>
-        </p:nvSpPr>
-        <p:spPr/>
-        <p:txBody>
-          <a:bodyPr>
-            <a:normAutofit fontScale="85000" lnSpcReduction="20000"/>
-          </a:bodyPr>
-          <a:lstStyle/>
-          <a:p>
-            <a:r>
-              <a:rPr lang="en-US" smtClean="0"/>
-              <a:t>Lecture 2–3: The Process Model</a:t>
-            </a:r>
-          </a:p>
-          <a:p>
-            <a:r>
-              <a:rPr lang="en-US" smtClean="0"/>
-              <a:t>Lab2: Kernel implicationsof IPC</a:t>
-            </a:r>
-          </a:p>
-          <a:p>
-            <a:r>
-              <a:rPr lang="en-US" smtClean="0"/>
-              <a:t>Lab3: Micro-architectural implications of IPC  </a:t>
-            </a:r>
-          </a:p>
-          <a:p>
-            <a:r>
-              <a:rPr lang="en-US" smtClean="0"/>
-              <a:t>LabReport2:IPC Performance (assessed)</a:t>
-            </a:r>
-            <a:endParaRPr lang="en-US" dirty="0"/>
-          </a:p>
-        </p:txBody>
-      </p:sp>
       <p:pic>
         <p:nvPicPr>
           <p:cNvPr id="9" name="Picture Placeholder 8"/>
@@ -3777,6 +3773,49 @@
           </a:solidFill>
         </p:spPr>
       </p:pic>
+      <p:sp>
+        <p:nvSpPr>
+          <p:cNvPr id="5" name="Content Placeholder 4"/>
+          <p:cNvSpPr>
+            <a:spLocks noGrp="1"/>
+          </p:cNvSpPr>
+          <p:nvPr>
+            <p:ph idx="13"/>
+          </p:nvPr>
+        </p:nvSpPr>
+        <p:spPr/>
+        <p:txBody>
+          <a:bodyPr>
+            <a:normAutofit fontScale="85000" lnSpcReduction="20000"/>
+          </a:bodyPr>
+          <a:lstStyle/>
+          <a:p>
+            <a:r>
+              <a:rPr lang="en-US" smtClean="0"/>
+              <a:t>Lecture 2–3: The Process Model</a:t>
+            </a:r>
+          </a:p>
+          <a:p>
+            <a:r>
+              <a:rPr lang="en-US" smtClean="0"/>
+              <a:t>Lab2: Kernel implicationsof IPC</a:t>
+            </a:r>
+          </a:p>
+          <a:p>
+            <a:r>
+              <a:rPr lang="en-US" smtClean="0"/>
+              <a:t>Lab3: Micro-architectural implications of IPC  </a:t>
+            </a:r>
+          </a:p>
+          <a:p>
+            <a:r>
+              <a:rPr lang="en-US" smtClean="0"/>
+              <a:t>LabReport2:IPC Performance (assessed)</a:t>
+            </a:r>
+            <a:endParaRPr lang="en-US" dirty="0"/>
+          </a:p>
+        </p:txBody>
+      </p:sp>
     </p:spTree>
     <p:extLst>
       <p:ext uri="{BB962C8B-B14F-4D97-AF65-F5344CB8AC3E}">
@@ -4324,11 +4363,7 @@
           <a:p>
             <a:r>
               <a:rPr lang="en-US" dirty="0" smtClean="0"/>
-              <a:t>Familiarize </a:t>
-            </a:r>
-            <a:r>
-              <a:rPr lang="en-US" dirty="0" smtClean="0"/>
-              <a:t>people </a:t>
+              <a:t>Familiarize people </a:t>
             </a:r>
             <a:r>
               <a:rPr lang="en-US" dirty="0" err="1" smtClean="0"/>
@@ -4436,11 +4471,7 @@
           <a:p>
             <a:r>
               <a:rPr lang="en-US" dirty="0" smtClean="0"/>
-              <a:t>Two</a:t>
-            </a:r>
-            <a:r>
-              <a:rPr lang="en-US" dirty="0" smtClean="0"/>
-              <a:t>, 8 hour days</a:t>
+              <a:t>Two, 8 hour days</a:t>
             </a:r>
           </a:p>
           <a:p>
@@ -4470,16 +4501,11 @@
               <a:rPr lang="en-US" dirty="0" smtClean="0"/>
               <a:t> 2015, 2016, </a:t>
             </a:r>
-            <a:endParaRPr lang="en-US" dirty="0" smtClean="0"/>
-          </a:p>
-          <a:p>
-            <a:r>
-              <a:rPr lang="en-US" dirty="0" smtClean="0"/>
-              <a:t>Next </a:t>
-            </a:r>
-            <a:r>
-              <a:rPr lang="en-US" dirty="0" smtClean="0"/>
-              <a:t>course: </a:t>
+          </a:p>
+          <a:p>
+            <a:r>
+              <a:rPr lang="en-US" dirty="0" smtClean="0"/>
+              <a:t>Next course: </a:t>
             </a:r>
             <a:r>
               <a:rPr lang="en-US" dirty="0" err="1" smtClean="0"/>
@@ -4489,7 +4515,6 @@
               <a:rPr lang="en-US" dirty="0" smtClean="0"/>
               <a:t> 2016 in Belgrade</a:t>
             </a:r>
-            <a:endParaRPr lang="en-US" dirty="0" smtClean="0"/>
           </a:p>
         </p:txBody>
       </p:sp>
@@ -5036,11 +5061,7 @@
           <a:p>
             <a:r>
               <a:rPr lang="en-US" dirty="0" smtClean="0"/>
-              <a:t>VMs are </a:t>
-            </a:r>
-            <a:r>
-              <a:rPr lang="en-US" dirty="0" smtClean="0"/>
-              <a:t>better for a time constrained class</a:t>
+              <a:t>VMs are better for a time constrained class</a:t>
             </a:r>
           </a:p>
           <a:p>
@@ -10265,11 +10286,7 @@
           <a:p>
             <a:r>
               <a:rPr lang="en-US" dirty="0" smtClean="0"/>
-              <a:t>Retain </a:t>
-            </a:r>
-            <a:r>
-              <a:rPr lang="en-US" dirty="0" smtClean="0"/>
-              <a:t>current approach, structure – it worked!</a:t>
+              <a:t>Retain current approach, structure – it worked!</a:t>
             </a:r>
           </a:p>
           <a:p>
@@ -10322,7 +10339,6 @@
               <a:rPr lang="en-US" b="1" dirty="0" smtClean="0"/>
               <a:t>PowerPoint</a:t>
             </a:r>
-            <a:endParaRPr lang="en-US" b="1" dirty="0" smtClean="0"/>
           </a:p>
           <a:p>
             <a:r>
@@ -10387,13 +10403,8 @@
           <a:p>
             <a:r>
               <a:rPr lang="en-US" dirty="0" smtClean="0"/>
-              <a:t>Select a cheaper </a:t>
-            </a:r>
-            <a:r>
-              <a:rPr lang="en-US" dirty="0" smtClean="0"/>
-              <a:t>alternative</a:t>
-            </a:r>
-            <a:endParaRPr lang="en-US" dirty="0" smtClean="0"/>
+              <a:t>Select a cheaper alternative</a:t>
+            </a:r>
           </a:p>
         </p:txBody>
       </p:sp>
@@ -10678,7 +10689,6 @@
               <a:rPr lang="en-US" b="1" i="1" dirty="0" smtClean="0"/>
               <a:t>in a private repo</a:t>
             </a:r>
-            <a:endParaRPr lang="en-US" b="1" i="1" dirty="0" smtClean="0"/>
           </a:p>
           <a:p>
             <a:r>
@@ -11541,15 +11551,7 @@
           <a:p>
             <a:r>
               <a:rPr lang="en-US" dirty="0" smtClean="0"/>
-              <a:t>Aims of </a:t>
-            </a:r>
-            <a:r>
-              <a:rPr lang="en-US" dirty="0" smtClean="0"/>
-              <a:t>the Masters </a:t>
-            </a:r>
-            <a:r>
-              <a:rPr lang="en-US" dirty="0" smtClean="0"/>
-              <a:t>course</a:t>
+              <a:t>Aims of the Masters course</a:t>
             </a:r>
             <a:endParaRPr lang="en-US" dirty="0"/>
           </a:p>
@@ -11660,11 +11662,7 @@
           <a:p>
             <a:r>
               <a:rPr lang="en-US" dirty="0" smtClean="0"/>
-              <a:t>Masters Course </a:t>
-            </a:r>
-            <a:r>
-              <a:rPr lang="en-US" dirty="0" smtClean="0"/>
-              <a:t>Structure</a:t>
+              <a:t>Masters Course Structure</a:t>
             </a:r>
             <a:endParaRPr lang="en-US" dirty="0"/>
           </a:p>
@@ -12235,7 +12233,7 @@
   <a:extraClrSchemeLst/>
   <a:extLst>
     <a:ext uri="{05A4C25C-085E-4340-85A3-A5531E510DB2}">
-      <thm15:themeFamily xmlns:thm15="http://schemas.microsoft.com/office/thememl/2012/main" name="Office Theme" id="{62F939B6-93AF-4DB8-9C6B-D6C7DFDC589F}" vid="{4A3C46E8-61CC-4603-A589-7422A47A8E4A}"/>
+      <thm15:themeFamily xmlns:thm15="http://schemas.microsoft.com/office/thememl/2012/main" name="teachbsd" id="{31405607-42C2-5540-9BE3-DCF1D768130C}" vid="{608A3570-CFC3-F844-99A1-0650DB4B2835}"/>
     </a:ext>
   </a:extLst>
 </a:theme>

</xml_diff>